<commit_message>
add code snippets to powerPoint tags
</commit_message>
<xml_diff>
--- a/documents/DateN’Rate.pptx
+++ b/documents/DateN’Rate.pptx
@@ -14,7 +14,12 @@
     <p:sldId id="258" r:id="rId8"/>
     <p:sldId id="260" r:id="rId9"/>
     <p:sldId id="262" r:id="rId10"/>
-    <p:sldId id="263" r:id="rId11"/>
+    <p:sldId id="266" r:id="rId11"/>
+    <p:sldId id="267" r:id="rId12"/>
+    <p:sldId id="268" r:id="rId13"/>
+    <p:sldId id="269" r:id="rId14"/>
+    <p:sldId id="270" r:id="rId15"/>
+    <p:sldId id="263" r:id="rId16"/>
   </p:sldIdLst>
   <p:sldSz cx="12192000" cy="6858000"/>
   <p:notesSz cx="6858000" cy="9144000"/>
@@ -113,6 +118,11 @@
       </a:defRPr>
     </a:lvl9pPr>
   </p:defaultTextStyle>
+  <p:extLst>
+    <p:ext uri="{EFAFB233-063F-42B5-8137-9DF3F51BA10A}">
+      <p15:sldGuideLst xmlns:p15="http://schemas.microsoft.com/office/powerpoint/2012/main"/>
+    </p:ext>
+  </p:extLst>
 </p:presentation>
 </file>
 
@@ -302,7 +312,7 @@
           <a:p>
             <a:fld id="{A0AAC14C-2DF4-4F7F-83C6-F50FBC905877}" type="datetimeFigureOut">
               <a:rPr lang="da-DK" smtClean="0"/>
-              <a:t>12-11-2020</a:t>
+              <a:t>15-11-2020</a:t>
             </a:fld>
             <a:endParaRPr lang="da-DK"/>
           </a:p>
@@ -577,7 +587,7 @@
           <a:p>
             <a:fld id="{A0AAC14C-2DF4-4F7F-83C6-F50FBC905877}" type="datetimeFigureOut">
               <a:rPr lang="da-DK" smtClean="0"/>
-              <a:t>12-11-2020</a:t>
+              <a:t>15-11-2020</a:t>
             </a:fld>
             <a:endParaRPr lang="da-DK"/>
           </a:p>
@@ -771,7 +781,7 @@
           <a:p>
             <a:fld id="{A0AAC14C-2DF4-4F7F-83C6-F50FBC905877}" type="datetimeFigureOut">
               <a:rPr lang="da-DK" smtClean="0"/>
-              <a:t>12-11-2020</a:t>
+              <a:t>15-11-2020</a:t>
             </a:fld>
             <a:endParaRPr lang="da-DK"/>
           </a:p>
@@ -1042,7 +1052,7 @@
           <a:p>
             <a:fld id="{A0AAC14C-2DF4-4F7F-83C6-F50FBC905877}" type="datetimeFigureOut">
               <a:rPr lang="da-DK" smtClean="0"/>
-              <a:t>12-11-2020</a:t>
+              <a:t>15-11-2020</a:t>
             </a:fld>
             <a:endParaRPr lang="da-DK"/>
           </a:p>
@@ -1369,7 +1379,7 @@
           <a:p>
             <a:fld id="{A0AAC14C-2DF4-4F7F-83C6-F50FBC905877}" type="datetimeFigureOut">
               <a:rPr lang="da-DK" smtClean="0"/>
-              <a:t>12-11-2020</a:t>
+              <a:t>15-11-2020</a:t>
             </a:fld>
             <a:endParaRPr lang="da-DK"/>
           </a:p>
@@ -1988,7 +1998,7 @@
           <a:p>
             <a:fld id="{A0AAC14C-2DF4-4F7F-83C6-F50FBC905877}" type="datetimeFigureOut">
               <a:rPr lang="da-DK" smtClean="0"/>
-              <a:t>12-11-2020</a:t>
+              <a:t>15-11-2020</a:t>
             </a:fld>
             <a:endParaRPr lang="da-DK"/>
           </a:p>
@@ -2835,7 +2845,7 @@
           <a:p>
             <a:fld id="{A0AAC14C-2DF4-4F7F-83C6-F50FBC905877}" type="datetimeFigureOut">
               <a:rPr lang="da-DK" smtClean="0"/>
-              <a:t>12-11-2020</a:t>
+              <a:t>15-11-2020</a:t>
             </a:fld>
             <a:endParaRPr lang="da-DK"/>
           </a:p>
@@ -3005,7 +3015,7 @@
           <a:p>
             <a:fld id="{A0AAC14C-2DF4-4F7F-83C6-F50FBC905877}" type="datetimeFigureOut">
               <a:rPr lang="da-DK" smtClean="0"/>
-              <a:t>12-11-2020</a:t>
+              <a:t>15-11-2020</a:t>
             </a:fld>
             <a:endParaRPr lang="da-DK"/>
           </a:p>
@@ -3185,7 +3195,7 @@
           <a:p>
             <a:fld id="{A0AAC14C-2DF4-4F7F-83C6-F50FBC905877}" type="datetimeFigureOut">
               <a:rPr lang="da-DK" smtClean="0"/>
-              <a:t>12-11-2020</a:t>
+              <a:t>15-11-2020</a:t>
             </a:fld>
             <a:endParaRPr lang="da-DK"/>
           </a:p>
@@ -3355,7 +3365,7 @@
           <a:p>
             <a:fld id="{A0AAC14C-2DF4-4F7F-83C6-F50FBC905877}" type="datetimeFigureOut">
               <a:rPr lang="da-DK" smtClean="0"/>
-              <a:t>12-11-2020</a:t>
+              <a:t>15-11-2020</a:t>
             </a:fld>
             <a:endParaRPr lang="da-DK"/>
           </a:p>
@@ -3602,7 +3612,7 @@
           <a:p>
             <a:fld id="{A0AAC14C-2DF4-4F7F-83C6-F50FBC905877}" type="datetimeFigureOut">
               <a:rPr lang="da-DK" smtClean="0"/>
-              <a:t>12-11-2020</a:t>
+              <a:t>15-11-2020</a:t>
             </a:fld>
             <a:endParaRPr lang="da-DK"/>
           </a:p>
@@ -3894,7 +3904,7 @@
           <a:p>
             <a:fld id="{A0AAC14C-2DF4-4F7F-83C6-F50FBC905877}" type="datetimeFigureOut">
               <a:rPr lang="da-DK" smtClean="0"/>
-              <a:t>12-11-2020</a:t>
+              <a:t>15-11-2020</a:t>
             </a:fld>
             <a:endParaRPr lang="da-DK"/>
           </a:p>
@@ -4338,7 +4348,7 @@
           <a:p>
             <a:fld id="{A0AAC14C-2DF4-4F7F-83C6-F50FBC905877}" type="datetimeFigureOut">
               <a:rPr lang="da-DK" smtClean="0"/>
-              <a:t>12-11-2020</a:t>
+              <a:t>15-11-2020</a:t>
             </a:fld>
             <a:endParaRPr lang="da-DK"/>
           </a:p>
@@ -4456,7 +4466,7 @@
           <a:p>
             <a:fld id="{A0AAC14C-2DF4-4F7F-83C6-F50FBC905877}" type="datetimeFigureOut">
               <a:rPr lang="da-DK" smtClean="0"/>
-              <a:t>12-11-2020</a:t>
+              <a:t>15-11-2020</a:t>
             </a:fld>
             <a:endParaRPr lang="da-DK"/>
           </a:p>
@@ -4551,7 +4561,7 @@
           <a:p>
             <a:fld id="{A0AAC14C-2DF4-4F7F-83C6-F50FBC905877}" type="datetimeFigureOut">
               <a:rPr lang="da-DK" smtClean="0"/>
-              <a:t>12-11-2020</a:t>
+              <a:t>15-11-2020</a:t>
             </a:fld>
             <a:endParaRPr lang="da-DK"/>
           </a:p>
@@ -4830,7 +4840,7 @@
           <a:p>
             <a:fld id="{A0AAC14C-2DF4-4F7F-83C6-F50FBC905877}" type="datetimeFigureOut">
               <a:rPr lang="da-DK" smtClean="0"/>
-              <a:t>12-11-2020</a:t>
+              <a:t>15-11-2020</a:t>
             </a:fld>
             <a:endParaRPr lang="da-DK"/>
           </a:p>
@@ -5105,7 +5115,7 @@
           <a:p>
             <a:fld id="{A0AAC14C-2DF4-4F7F-83C6-F50FBC905877}" type="datetimeFigureOut">
               <a:rPr lang="da-DK" smtClean="0"/>
-              <a:t>12-11-2020</a:t>
+              <a:t>15-11-2020</a:t>
             </a:fld>
             <a:endParaRPr lang="da-DK"/>
           </a:p>
@@ -5528,7 +5538,7 @@
           <a:p>
             <a:fld id="{A0AAC14C-2DF4-4F7F-83C6-F50FBC905877}" type="datetimeFigureOut">
               <a:rPr lang="da-DK" smtClean="0"/>
-              <a:t>12-11-2020</a:t>
+              <a:t>15-11-2020</a:t>
             </a:fld>
             <a:endParaRPr lang="da-DK"/>
           </a:p>
@@ -6145,6 +6155,509 @@
           <p:cNvPr id="2" name="Titel 1">
             <a:extLst>
               <a:ext uri="{FF2B5EF4-FFF2-40B4-BE49-F238E27FC236}">
+                <a16:creationId xmlns:a16="http://schemas.microsoft.com/office/drawing/2014/main" id="{E599E423-A5E2-4EDD-8127-38E25F51F78F}"/>
+              </a:ext>
+            </a:extLst>
+          </p:cNvPr>
+          <p:cNvSpPr>
+            <a:spLocks noGrp="1"/>
+          </p:cNvSpPr>
+          <p:nvPr>
+            <p:ph type="title"/>
+          </p:nvPr>
+        </p:nvSpPr>
+        <p:spPr/>
+        <p:txBody>
+          <a:bodyPr/>
+          <a:lstStyle/>
+          <a:p>
+            <a:r>
+              <a:rPr lang="da-DK" dirty="0" err="1"/>
+              <a:t>DemoController</a:t>
+            </a:r>
+            <a:r>
+              <a:rPr lang="da-DK" dirty="0"/>
+              <a:t> - </a:t>
+            </a:r>
+            <a:r>
+              <a:rPr lang="da-DK" dirty="0" err="1"/>
+              <a:t>PostMapping</a:t>
+            </a:r>
+            <a:endParaRPr lang="da-DK" dirty="0"/>
+          </a:p>
+        </p:txBody>
+      </p:sp>
+      <p:pic>
+        <p:nvPicPr>
+          <p:cNvPr id="6" name="Billede 5">
+            <a:extLst>
+              <a:ext uri="{FF2B5EF4-FFF2-40B4-BE49-F238E27FC236}">
+                <a16:creationId xmlns:a16="http://schemas.microsoft.com/office/drawing/2014/main" id="{1C6B6043-86B6-48D1-A2B3-8BFA280BD29E}"/>
+              </a:ext>
+            </a:extLst>
+          </p:cNvPr>
+          <p:cNvPicPr>
+            <a:picLocks noChangeAspect="1"/>
+          </p:cNvPicPr>
+          <p:nvPr/>
+        </p:nvPicPr>
+        <p:blipFill>
+          <a:blip r:embed="rId2"/>
+          <a:stretch>
+            <a:fillRect/>
+          </a:stretch>
+        </p:blipFill>
+        <p:spPr>
+          <a:xfrm>
+            <a:off x="1571809" y="1962150"/>
+            <a:ext cx="7553325" cy="1466850"/>
+          </a:xfrm>
+          <a:prstGeom prst="rect">
+            <a:avLst/>
+          </a:prstGeom>
+        </p:spPr>
+      </p:pic>
+      <p:pic>
+        <p:nvPicPr>
+          <p:cNvPr id="7" name="Billede 6">
+            <a:extLst>
+              <a:ext uri="{FF2B5EF4-FFF2-40B4-BE49-F238E27FC236}">
+                <a16:creationId xmlns:a16="http://schemas.microsoft.com/office/drawing/2014/main" id="{99896E23-8935-47AD-9A21-97E3EDED92D8}"/>
+              </a:ext>
+            </a:extLst>
+          </p:cNvPr>
+          <p:cNvPicPr>
+            <a:picLocks noChangeAspect="1"/>
+          </p:cNvPicPr>
+          <p:nvPr/>
+        </p:nvPicPr>
+        <p:blipFill>
+          <a:blip r:embed="rId3"/>
+          <a:stretch>
+            <a:fillRect/>
+          </a:stretch>
+        </p:blipFill>
+        <p:spPr>
+          <a:xfrm>
+            <a:off x="2386776" y="3856990"/>
+            <a:ext cx="5314950" cy="2295525"/>
+          </a:xfrm>
+          <a:prstGeom prst="rect">
+            <a:avLst/>
+          </a:prstGeom>
+        </p:spPr>
+      </p:pic>
+    </p:spTree>
+    <p:extLst>
+      <p:ext uri="{BB962C8B-B14F-4D97-AF65-F5344CB8AC3E}">
+        <p14:creationId xmlns:p14="http://schemas.microsoft.com/office/powerpoint/2010/main" val="3064781137"/>
+      </p:ext>
+    </p:extLst>
+  </p:cSld>
+  <p:clrMapOvr>
+    <a:masterClrMapping/>
+  </p:clrMapOvr>
+</p:sld>
+</file>
+
+<file path=ppt/slides/slide11.xml><?xml version="1.0" encoding="utf-8"?>
+<p:sld xmlns:a="http://schemas.openxmlformats.org/drawingml/2006/main" xmlns:r="http://schemas.openxmlformats.org/officeDocument/2006/relationships" xmlns:p="http://schemas.openxmlformats.org/presentationml/2006/main">
+  <p:cSld>
+    <p:spTree>
+      <p:nvGrpSpPr>
+        <p:cNvPr id="1" name=""/>
+        <p:cNvGrpSpPr/>
+        <p:nvPr/>
+      </p:nvGrpSpPr>
+      <p:grpSpPr>
+        <a:xfrm>
+          <a:off x="0" y="0"/>
+          <a:ext cx="0" cy="0"/>
+          <a:chOff x="0" y="0"/>
+          <a:chExt cx="0" cy="0"/>
+        </a:xfrm>
+      </p:grpSpPr>
+      <p:sp>
+        <p:nvSpPr>
+          <p:cNvPr id="2" name="Titel 1">
+            <a:extLst>
+              <a:ext uri="{FF2B5EF4-FFF2-40B4-BE49-F238E27FC236}">
+                <a16:creationId xmlns:a16="http://schemas.microsoft.com/office/drawing/2014/main" id="{E20FF6D1-F2C3-4287-A404-8EDE1A74B04D}"/>
+              </a:ext>
+            </a:extLst>
+          </p:cNvPr>
+          <p:cNvSpPr>
+            <a:spLocks noGrp="1"/>
+          </p:cNvSpPr>
+          <p:nvPr>
+            <p:ph type="title"/>
+          </p:nvPr>
+        </p:nvSpPr>
+        <p:spPr/>
+        <p:txBody>
+          <a:bodyPr/>
+          <a:lstStyle/>
+          <a:p>
+            <a:endParaRPr lang="da-DK"/>
+          </a:p>
+        </p:txBody>
+      </p:sp>
+      <p:pic>
+        <p:nvPicPr>
+          <p:cNvPr id="4" name="Pladsholder til indhold 3">
+            <a:extLst>
+              <a:ext uri="{FF2B5EF4-FFF2-40B4-BE49-F238E27FC236}">
+                <a16:creationId xmlns:a16="http://schemas.microsoft.com/office/drawing/2014/main" id="{D6A112EC-D356-47E3-A305-6B5724C6D584}"/>
+              </a:ext>
+            </a:extLst>
+          </p:cNvPr>
+          <p:cNvPicPr>
+            <a:picLocks noGrp="1" noChangeAspect="1"/>
+          </p:cNvPicPr>
+          <p:nvPr>
+            <p:ph idx="1"/>
+          </p:nvPr>
+        </p:nvPicPr>
+        <p:blipFill>
+          <a:blip r:embed="rId2"/>
+          <a:stretch>
+            <a:fillRect/>
+          </a:stretch>
+        </p:blipFill>
+        <p:spPr>
+          <a:xfrm>
+            <a:off x="1233488" y="2131219"/>
+            <a:ext cx="8686800" cy="4038600"/>
+          </a:xfrm>
+          <a:prstGeom prst="rect">
+            <a:avLst/>
+          </a:prstGeom>
+        </p:spPr>
+      </p:pic>
+    </p:spTree>
+    <p:extLst>
+      <p:ext uri="{BB962C8B-B14F-4D97-AF65-F5344CB8AC3E}">
+        <p14:creationId xmlns:p14="http://schemas.microsoft.com/office/powerpoint/2010/main" val="3191869660"/>
+      </p:ext>
+    </p:extLst>
+  </p:cSld>
+  <p:clrMapOvr>
+    <a:masterClrMapping/>
+  </p:clrMapOvr>
+</p:sld>
+</file>
+
+<file path=ppt/slides/slide12.xml><?xml version="1.0" encoding="utf-8"?>
+<p:sld xmlns:a="http://schemas.openxmlformats.org/drawingml/2006/main" xmlns:r="http://schemas.openxmlformats.org/officeDocument/2006/relationships" xmlns:p="http://schemas.openxmlformats.org/presentationml/2006/main">
+  <p:cSld>
+    <p:spTree>
+      <p:nvGrpSpPr>
+        <p:cNvPr id="1" name=""/>
+        <p:cNvGrpSpPr/>
+        <p:nvPr/>
+      </p:nvGrpSpPr>
+      <p:grpSpPr>
+        <a:xfrm>
+          <a:off x="0" y="0"/>
+          <a:ext cx="0" cy="0"/>
+          <a:chOff x="0" y="0"/>
+          <a:chExt cx="0" cy="0"/>
+        </a:xfrm>
+      </p:grpSpPr>
+      <p:sp>
+        <p:nvSpPr>
+          <p:cNvPr id="2" name="Titel 1">
+            <a:extLst>
+              <a:ext uri="{FF2B5EF4-FFF2-40B4-BE49-F238E27FC236}">
+                <a16:creationId xmlns:a16="http://schemas.microsoft.com/office/drawing/2014/main" id="{BC40C656-6233-4409-9415-1290DD3D8D24}"/>
+              </a:ext>
+            </a:extLst>
+          </p:cNvPr>
+          <p:cNvSpPr>
+            <a:spLocks noGrp="1"/>
+          </p:cNvSpPr>
+          <p:nvPr>
+            <p:ph type="title"/>
+          </p:nvPr>
+        </p:nvSpPr>
+        <p:spPr/>
+        <p:txBody>
+          <a:bodyPr/>
+          <a:lstStyle/>
+          <a:p>
+            <a:endParaRPr lang="da-DK"/>
+          </a:p>
+        </p:txBody>
+      </p:sp>
+      <p:pic>
+        <p:nvPicPr>
+          <p:cNvPr id="5" name="Pladsholder til indhold 4">
+            <a:extLst>
+              <a:ext uri="{FF2B5EF4-FFF2-40B4-BE49-F238E27FC236}">
+                <a16:creationId xmlns:a16="http://schemas.microsoft.com/office/drawing/2014/main" id="{E7E29E03-12B1-4E59-95BF-D928410F208D}"/>
+              </a:ext>
+            </a:extLst>
+          </p:cNvPr>
+          <p:cNvPicPr>
+            <a:picLocks noGrp="1" noChangeAspect="1"/>
+          </p:cNvPicPr>
+          <p:nvPr>
+            <p:ph idx="1"/>
+          </p:nvPr>
+        </p:nvPicPr>
+        <p:blipFill>
+          <a:blip r:embed="rId2"/>
+          <a:stretch>
+            <a:fillRect/>
+          </a:stretch>
+        </p:blipFill>
+        <p:spPr>
+          <a:xfrm>
+            <a:off x="352538" y="2400519"/>
+            <a:ext cx="10947316" cy="738109"/>
+          </a:xfrm>
+          <a:prstGeom prst="rect">
+            <a:avLst/>
+          </a:prstGeom>
+        </p:spPr>
+      </p:pic>
+      <p:pic>
+        <p:nvPicPr>
+          <p:cNvPr id="7" name="Billede 6">
+            <a:extLst>
+              <a:ext uri="{FF2B5EF4-FFF2-40B4-BE49-F238E27FC236}">
+                <a16:creationId xmlns:a16="http://schemas.microsoft.com/office/drawing/2014/main" id="{DEB0021D-FB2A-4AF7-899A-5D1709F6953D}"/>
+              </a:ext>
+            </a:extLst>
+          </p:cNvPr>
+          <p:cNvPicPr>
+            <a:picLocks noChangeAspect="1"/>
+          </p:cNvPicPr>
+          <p:nvPr/>
+        </p:nvPicPr>
+        <p:blipFill>
+          <a:blip r:embed="rId3"/>
+          <a:stretch>
+            <a:fillRect/>
+          </a:stretch>
+        </p:blipFill>
+        <p:spPr>
+          <a:xfrm>
+            <a:off x="352538" y="2845725"/>
+            <a:ext cx="10947316" cy="585805"/>
+          </a:xfrm>
+          <a:prstGeom prst="rect">
+            <a:avLst/>
+          </a:prstGeom>
+        </p:spPr>
+      </p:pic>
+    </p:spTree>
+    <p:extLst>
+      <p:ext uri="{BB962C8B-B14F-4D97-AF65-F5344CB8AC3E}">
+        <p14:creationId xmlns:p14="http://schemas.microsoft.com/office/powerpoint/2010/main" val="971087820"/>
+      </p:ext>
+    </p:extLst>
+  </p:cSld>
+  <p:clrMapOvr>
+    <a:masterClrMapping/>
+  </p:clrMapOvr>
+</p:sld>
+</file>
+
+<file path=ppt/slides/slide13.xml><?xml version="1.0" encoding="utf-8"?>
+<p:sld xmlns:a="http://schemas.openxmlformats.org/drawingml/2006/main" xmlns:r="http://schemas.openxmlformats.org/officeDocument/2006/relationships" xmlns:p="http://schemas.openxmlformats.org/presentationml/2006/main">
+  <p:cSld>
+    <p:spTree>
+      <p:nvGrpSpPr>
+        <p:cNvPr id="1" name=""/>
+        <p:cNvGrpSpPr/>
+        <p:nvPr/>
+      </p:nvGrpSpPr>
+      <p:grpSpPr>
+        <a:xfrm>
+          <a:off x="0" y="0"/>
+          <a:ext cx="0" cy="0"/>
+          <a:chOff x="0" y="0"/>
+          <a:chExt cx="0" cy="0"/>
+        </a:xfrm>
+      </p:grpSpPr>
+      <p:sp>
+        <p:nvSpPr>
+          <p:cNvPr id="2" name="Titel 1">
+            <a:extLst>
+              <a:ext uri="{FF2B5EF4-FFF2-40B4-BE49-F238E27FC236}">
+                <a16:creationId xmlns:a16="http://schemas.microsoft.com/office/drawing/2014/main" id="{50ECE79F-C195-49E7-A5BD-0DB3E518C9DA}"/>
+              </a:ext>
+            </a:extLst>
+          </p:cNvPr>
+          <p:cNvSpPr>
+            <a:spLocks noGrp="1"/>
+          </p:cNvSpPr>
+          <p:nvPr>
+            <p:ph type="title"/>
+          </p:nvPr>
+        </p:nvSpPr>
+        <p:spPr/>
+        <p:txBody>
+          <a:bodyPr/>
+          <a:lstStyle/>
+          <a:p>
+            <a:endParaRPr lang="da-DK"/>
+          </a:p>
+        </p:txBody>
+      </p:sp>
+      <p:pic>
+        <p:nvPicPr>
+          <p:cNvPr id="4" name="Billede 3">
+            <a:extLst>
+              <a:ext uri="{FF2B5EF4-FFF2-40B4-BE49-F238E27FC236}">
+                <a16:creationId xmlns:a16="http://schemas.microsoft.com/office/drawing/2014/main" id="{C280E345-0168-4716-BFB3-B26F4293425B}"/>
+              </a:ext>
+            </a:extLst>
+          </p:cNvPr>
+          <p:cNvPicPr>
+            <a:picLocks noChangeAspect="1"/>
+          </p:cNvPicPr>
+          <p:nvPr/>
+        </p:nvPicPr>
+        <p:blipFill>
+          <a:blip r:embed="rId2"/>
+          <a:stretch>
+            <a:fillRect/>
+          </a:stretch>
+        </p:blipFill>
+        <p:spPr>
+          <a:xfrm>
+            <a:off x="1811226" y="1243834"/>
+            <a:ext cx="7877522" cy="5251681"/>
+          </a:xfrm>
+          <a:prstGeom prst="rect">
+            <a:avLst/>
+          </a:prstGeom>
+        </p:spPr>
+      </p:pic>
+    </p:spTree>
+    <p:extLst>
+      <p:ext uri="{BB962C8B-B14F-4D97-AF65-F5344CB8AC3E}">
+        <p14:creationId xmlns:p14="http://schemas.microsoft.com/office/powerpoint/2010/main" val="4011612521"/>
+      </p:ext>
+    </p:extLst>
+  </p:cSld>
+  <p:clrMapOvr>
+    <a:masterClrMapping/>
+  </p:clrMapOvr>
+</p:sld>
+</file>
+
+<file path=ppt/slides/slide14.xml><?xml version="1.0" encoding="utf-8"?>
+<p:sld xmlns:a="http://schemas.openxmlformats.org/drawingml/2006/main" xmlns:r="http://schemas.openxmlformats.org/officeDocument/2006/relationships" xmlns:p="http://schemas.openxmlformats.org/presentationml/2006/main">
+  <p:cSld>
+    <p:spTree>
+      <p:nvGrpSpPr>
+        <p:cNvPr id="1" name=""/>
+        <p:cNvGrpSpPr/>
+        <p:nvPr/>
+      </p:nvGrpSpPr>
+      <p:grpSpPr>
+        <a:xfrm>
+          <a:off x="0" y="0"/>
+          <a:ext cx="0" cy="0"/>
+          <a:chOff x="0" y="0"/>
+          <a:chExt cx="0" cy="0"/>
+        </a:xfrm>
+      </p:grpSpPr>
+      <p:sp>
+        <p:nvSpPr>
+          <p:cNvPr id="2" name="Titel 1">
+            <a:extLst>
+              <a:ext uri="{FF2B5EF4-FFF2-40B4-BE49-F238E27FC236}">
+                <a16:creationId xmlns:a16="http://schemas.microsoft.com/office/drawing/2014/main" id="{194A573D-E1B1-4B33-AF24-AE9BC845BD3A}"/>
+              </a:ext>
+            </a:extLst>
+          </p:cNvPr>
+          <p:cNvSpPr>
+            <a:spLocks noGrp="1"/>
+          </p:cNvSpPr>
+          <p:nvPr>
+            <p:ph type="title"/>
+          </p:nvPr>
+        </p:nvSpPr>
+        <p:spPr/>
+        <p:txBody>
+          <a:bodyPr/>
+          <a:lstStyle/>
+          <a:p>
+            <a:endParaRPr lang="da-DK"/>
+          </a:p>
+        </p:txBody>
+      </p:sp>
+      <p:pic>
+        <p:nvPicPr>
+          <p:cNvPr id="4" name="Pladsholder til indhold 3">
+            <a:extLst>
+              <a:ext uri="{FF2B5EF4-FFF2-40B4-BE49-F238E27FC236}">
+                <a16:creationId xmlns:a16="http://schemas.microsoft.com/office/drawing/2014/main" id="{A7875FE6-BFF7-4A36-B7AE-B9FF0C5DB50D}"/>
+              </a:ext>
+            </a:extLst>
+          </p:cNvPr>
+          <p:cNvPicPr>
+            <a:picLocks noGrp="1" noChangeAspect="1"/>
+          </p:cNvPicPr>
+          <p:nvPr>
+            <p:ph idx="1"/>
+          </p:nvPr>
+        </p:nvPicPr>
+        <p:blipFill>
+          <a:blip r:embed="rId2"/>
+          <a:stretch>
+            <a:fillRect/>
+          </a:stretch>
+        </p:blipFill>
+        <p:spPr>
+          <a:xfrm>
+            <a:off x="1103313" y="2294169"/>
+            <a:ext cx="8947150" cy="3712700"/>
+          </a:xfrm>
+          <a:prstGeom prst="rect">
+            <a:avLst/>
+          </a:prstGeom>
+        </p:spPr>
+      </p:pic>
+    </p:spTree>
+    <p:extLst>
+      <p:ext uri="{BB962C8B-B14F-4D97-AF65-F5344CB8AC3E}">
+        <p14:creationId xmlns:p14="http://schemas.microsoft.com/office/powerpoint/2010/main" val="949776799"/>
+      </p:ext>
+    </p:extLst>
+  </p:cSld>
+  <p:clrMapOvr>
+    <a:masterClrMapping/>
+  </p:clrMapOvr>
+</p:sld>
+</file>
+
+<file path=ppt/slides/slide15.xml><?xml version="1.0" encoding="utf-8"?>
+<p:sld xmlns:a="http://schemas.openxmlformats.org/drawingml/2006/main" xmlns:r="http://schemas.openxmlformats.org/officeDocument/2006/relationships" xmlns:p="http://schemas.openxmlformats.org/presentationml/2006/main">
+  <p:cSld>
+    <p:spTree>
+      <p:nvGrpSpPr>
+        <p:cNvPr id="1" name=""/>
+        <p:cNvGrpSpPr/>
+        <p:nvPr/>
+      </p:nvGrpSpPr>
+      <p:grpSpPr>
+        <a:xfrm>
+          <a:off x="0" y="0"/>
+          <a:ext cx="0" cy="0"/>
+          <a:chOff x="0" y="0"/>
+          <a:chExt cx="0" cy="0"/>
+        </a:xfrm>
+      </p:grpSpPr>
+      <p:sp>
+        <p:nvSpPr>
+          <p:cNvPr id="2" name="Titel 1">
+            <a:extLst>
+              <a:ext uri="{FF2B5EF4-FFF2-40B4-BE49-F238E27FC236}">
                 <a16:creationId xmlns:a16="http://schemas.microsoft.com/office/drawing/2014/main" id="{426BA3BD-814D-4C74-9B2F-73E5978BBF89}"/>
               </a:ext>
             </a:extLst>
@@ -7058,36 +7571,48 @@
           <a:p>
             <a:r>
               <a:rPr lang="da-DK" dirty="0"/>
-              <a:t>Tag system - Phillip</a:t>
-            </a:r>
-          </a:p>
-        </p:txBody>
-      </p:sp>
-      <p:sp>
-        <p:nvSpPr>
-          <p:cNvPr id="3" name="Pladsholder til indhold 2">
+              <a:t>Tag system – Phillip</a:t>
+            </a:r>
+            <a:br>
+              <a:rPr lang="da-DK" dirty="0"/>
+            </a:br>
+            <a:r>
+              <a:rPr lang="da-DK" dirty="0"/>
+              <a:t>userProfile.html</a:t>
+            </a:r>
+          </a:p>
+        </p:txBody>
+      </p:sp>
+      <p:pic>
+        <p:nvPicPr>
+          <p:cNvPr id="4" name="Billede 3">
             <a:extLst>
               <a:ext uri="{FF2B5EF4-FFF2-40B4-BE49-F238E27FC236}">
-                <a16:creationId xmlns:a16="http://schemas.microsoft.com/office/drawing/2014/main" id="{A70A5B70-F2AC-435C-B638-465563D42B2F}"/>
+                <a16:creationId xmlns:a16="http://schemas.microsoft.com/office/drawing/2014/main" id="{29399E17-5A65-45E0-83AD-22196DA5F212}"/>
               </a:ext>
             </a:extLst>
           </p:cNvPr>
-          <p:cNvSpPr>
-            <a:spLocks noGrp="1"/>
-          </p:cNvSpPr>
-          <p:nvPr>
-            <p:ph idx="1"/>
-          </p:nvPr>
-        </p:nvSpPr>
-        <p:spPr/>
-        <p:txBody>
-          <a:bodyPr/>
-          <a:lstStyle/>
-          <a:p>
-            <a:endParaRPr lang="da-DK" dirty="0"/>
-          </a:p>
-        </p:txBody>
-      </p:sp>
+          <p:cNvPicPr>
+            <a:picLocks noChangeAspect="1"/>
+          </p:cNvPicPr>
+          <p:nvPr/>
+        </p:nvPicPr>
+        <p:blipFill>
+          <a:blip r:embed="rId2"/>
+          <a:stretch>
+            <a:fillRect/>
+          </a:stretch>
+        </p:blipFill>
+        <p:spPr>
+          <a:xfrm>
+            <a:off x="292329" y="2452737"/>
+            <a:ext cx="11283754" cy="3427382"/>
+          </a:xfrm>
+          <a:prstGeom prst="rect">
+            <a:avLst/>
+          </a:prstGeom>
+        </p:spPr>
+      </p:pic>
     </p:spTree>
     <p:extLst>
       <p:ext uri="{BB962C8B-B14F-4D97-AF65-F5344CB8AC3E}">

</xml_diff>

<commit_message>
added powerpoint slides and updated old powerpoint slides
</commit_message>
<xml_diff>
--- a/documents/DateN’Rate.pptx
+++ b/documents/DateN’Rate.pptx
@@ -6,20 +6,23 @@
   </p:sldMasterIdLst>
   <p:sldIdLst>
     <p:sldId id="256" r:id="rId2"/>
-    <p:sldId id="259" r:id="rId3"/>
-    <p:sldId id="257" r:id="rId4"/>
-    <p:sldId id="264" r:id="rId5"/>
-    <p:sldId id="261" r:id="rId6"/>
-    <p:sldId id="265" r:id="rId7"/>
+    <p:sldId id="273" r:id="rId3"/>
+    <p:sldId id="259" r:id="rId4"/>
+    <p:sldId id="257" r:id="rId5"/>
+    <p:sldId id="264" r:id="rId6"/>
+    <p:sldId id="261" r:id="rId7"/>
     <p:sldId id="258" r:id="rId8"/>
-    <p:sldId id="260" r:id="rId9"/>
-    <p:sldId id="262" r:id="rId10"/>
-    <p:sldId id="266" r:id="rId11"/>
-    <p:sldId id="267" r:id="rId12"/>
-    <p:sldId id="268" r:id="rId13"/>
-    <p:sldId id="269" r:id="rId14"/>
-    <p:sldId id="270" r:id="rId15"/>
-    <p:sldId id="263" r:id="rId16"/>
+    <p:sldId id="265" r:id="rId9"/>
+    <p:sldId id="272" r:id="rId10"/>
+    <p:sldId id="271" r:id="rId11"/>
+    <p:sldId id="260" r:id="rId12"/>
+    <p:sldId id="262" r:id="rId13"/>
+    <p:sldId id="266" r:id="rId14"/>
+    <p:sldId id="267" r:id="rId15"/>
+    <p:sldId id="268" r:id="rId16"/>
+    <p:sldId id="269" r:id="rId17"/>
+    <p:sldId id="270" r:id="rId18"/>
+    <p:sldId id="263" r:id="rId19"/>
   </p:sldIdLst>
   <p:sldSz cx="12192000" cy="6858000"/>
   <p:notesSz cx="6858000" cy="9144000"/>
@@ -6155,7 +6158,7 @@
           <p:cNvPr id="2" name="Titel 1">
             <a:extLst>
               <a:ext uri="{FF2B5EF4-FFF2-40B4-BE49-F238E27FC236}">
-                <a16:creationId xmlns:a16="http://schemas.microsoft.com/office/drawing/2014/main" id="{E599E423-A5E2-4EDD-8127-38E25F51F78F}"/>
+                <a16:creationId xmlns:a16="http://schemas.microsoft.com/office/drawing/2014/main" id="{72B99574-FBAC-45BD-9B6F-A2D33E6D66FD}"/>
               </a:ext>
             </a:extLst>
           </p:cNvPr>
@@ -6172,27 +6175,104 @@
           <a:lstStyle/>
           <a:p>
             <a:r>
+              <a:rPr lang="da-DK" dirty="0"/>
+              <a:t>Democontroller</a:t>
+            </a:r>
+          </a:p>
+        </p:txBody>
+      </p:sp>
+      <p:sp>
+        <p:nvSpPr>
+          <p:cNvPr id="3" name="Pladsholder til indhold 2">
+            <a:extLst>
+              <a:ext uri="{FF2B5EF4-FFF2-40B4-BE49-F238E27FC236}">
+                <a16:creationId xmlns:a16="http://schemas.microsoft.com/office/drawing/2014/main" id="{DE1A4075-B437-4A06-A173-34E71EF73F6A}"/>
+              </a:ext>
+            </a:extLst>
+          </p:cNvPr>
+          <p:cNvSpPr>
+            <a:spLocks noGrp="1"/>
+          </p:cNvSpPr>
+          <p:nvPr>
+            <p:ph idx="1"/>
+          </p:nvPr>
+        </p:nvSpPr>
+        <p:spPr/>
+        <p:txBody>
+          <a:bodyPr/>
+          <a:lstStyle/>
+          <a:p>
+            <a:endParaRPr lang="da-DK" dirty="0"/>
+          </a:p>
+          <a:p>
+            <a:endParaRPr lang="da-DK" dirty="0"/>
+          </a:p>
+          <a:p>
+            <a:endParaRPr lang="da-DK" dirty="0"/>
+          </a:p>
+          <a:p>
+            <a:endParaRPr lang="da-DK" dirty="0"/>
+          </a:p>
+          <a:p>
+            <a:endParaRPr lang="da-DK" dirty="0"/>
+          </a:p>
+          <a:p>
+            <a:endParaRPr lang="da-DK" dirty="0"/>
+          </a:p>
+          <a:p>
+            <a:r>
+              <a:rPr lang="da-DK" dirty="0"/>
+              <a:t>Hvis man er logget ind på siden, bliver der lavet et </a:t>
+            </a:r>
+            <a:r>
               <a:rPr lang="da-DK" dirty="0" err="1"/>
-              <a:t>DemoController</a:t>
+              <a:t>thymeleaf</a:t>
             </a:r>
             <a:r>
               <a:rPr lang="da-DK" dirty="0"/>
-              <a:t> - </a:t>
+              <a:t> objekt der hedder </a:t>
             </a:r>
             <a:r>
               <a:rPr lang="da-DK" dirty="0" err="1"/>
-              <a:t>PostMapping</a:t>
-            </a:r>
-            <a:endParaRPr lang="da-DK" dirty="0"/>
+              <a:t>searchList</a:t>
+            </a:r>
+            <a:r>
+              <a:rPr lang="da-DK" dirty="0"/>
+              <a:t>, der indeholder </a:t>
+            </a:r>
+            <a:r>
+              <a:rPr lang="da-DK" dirty="0" err="1"/>
+              <a:t>userService.searchUser</a:t>
+            </a:r>
+            <a:r>
+              <a:rPr lang="da-DK" dirty="0"/>
+              <a:t>. Der igen indeholder vores </a:t>
+            </a:r>
+            <a:r>
+              <a:rPr lang="da-DK" dirty="0" err="1"/>
+              <a:t>query</a:t>
+            </a:r>
+            <a:r>
+              <a:rPr lang="da-DK" dirty="0"/>
+              <a:t> fra </a:t>
+            </a:r>
+            <a:r>
+              <a:rPr lang="da-DK" dirty="0" err="1"/>
+              <a:t>DAO’en</a:t>
+            </a:r>
+            <a:r>
+              <a:rPr lang="da-DK" dirty="0"/>
+              <a:t>.</a:t>
+            </a:r>
           </a:p>
         </p:txBody>
       </p:sp>
       <p:pic>
         <p:nvPicPr>
-          <p:cNvPr id="6" name="Billede 5">
+          <p:cNvPr id="4" name="Billede 3">
             <a:extLst>
               <a:ext uri="{FF2B5EF4-FFF2-40B4-BE49-F238E27FC236}">
-                <a16:creationId xmlns:a16="http://schemas.microsoft.com/office/drawing/2014/main" id="{1C6B6043-86B6-48D1-A2B3-8BFA280BD29E}"/>
+                <a16:creationId xmlns:a16="http://schemas.microsoft.com/office/drawing/2014/main" id="{BFBA419E-68AF-4F20-A222-BE363A2AE043}"/>
               </a:ext>
             </a:extLst>
           </p:cNvPr>
@@ -6209,38 +6289,8 @@
         </p:blipFill>
         <p:spPr>
           <a:xfrm>
-            <a:off x="1571809" y="1962150"/>
-            <a:ext cx="7553325" cy="1466850"/>
-          </a:xfrm>
-          <a:prstGeom prst="rect">
-            <a:avLst/>
-          </a:prstGeom>
-        </p:spPr>
-      </p:pic>
-      <p:pic>
-        <p:nvPicPr>
-          <p:cNvPr id="7" name="Billede 6">
-            <a:extLst>
-              <a:ext uri="{FF2B5EF4-FFF2-40B4-BE49-F238E27FC236}">
-                <a16:creationId xmlns:a16="http://schemas.microsoft.com/office/drawing/2014/main" id="{99896E23-8935-47AD-9A21-97E3EDED92D8}"/>
-              </a:ext>
-            </a:extLst>
-          </p:cNvPr>
-          <p:cNvPicPr>
-            <a:picLocks noChangeAspect="1"/>
-          </p:cNvPicPr>
-          <p:nvPr/>
-        </p:nvPicPr>
-        <p:blipFill>
-          <a:blip r:embed="rId3"/>
-          <a:stretch>
-            <a:fillRect/>
-          </a:stretch>
-        </p:blipFill>
-        <p:spPr>
-          <a:xfrm>
-            <a:off x="2386776" y="3856990"/>
-            <a:ext cx="5314950" cy="2295525"/>
+            <a:off x="751502" y="1452951"/>
+            <a:ext cx="8132069" cy="3035073"/>
           </a:xfrm>
           <a:prstGeom prst="rect">
             <a:avLst/>
@@ -6250,7 +6300,7 @@
     </p:spTree>
     <p:extLst>
       <p:ext uri="{BB962C8B-B14F-4D97-AF65-F5344CB8AC3E}">
-        <p14:creationId xmlns:p14="http://schemas.microsoft.com/office/powerpoint/2010/main" val="3064781137"/>
+        <p14:creationId xmlns:p14="http://schemas.microsoft.com/office/powerpoint/2010/main" val="4028106387"/>
       </p:ext>
     </p:extLst>
   </p:cSld>
@@ -6282,7 +6332,7 @@
           <p:cNvPr id="2" name="Titel 1">
             <a:extLst>
               <a:ext uri="{FF2B5EF4-FFF2-40B4-BE49-F238E27FC236}">
-                <a16:creationId xmlns:a16="http://schemas.microsoft.com/office/drawing/2014/main" id="{E20FF6D1-F2C3-4287-A404-8EDE1A74B04D}"/>
+                <a16:creationId xmlns:a16="http://schemas.microsoft.com/office/drawing/2014/main" id="{5750E6C7-5579-4274-9693-6EDEF0EA95E1}"/>
               </a:ext>
             </a:extLst>
           </p:cNvPr>
@@ -6298,25 +6348,113 @@
           <a:bodyPr/>
           <a:lstStyle/>
           <a:p>
-            <a:endParaRPr lang="da-DK"/>
+            <a:r>
+              <a:rPr lang="da-DK" dirty="0"/>
+              <a:t>Søge system - HTML</a:t>
+            </a:r>
+          </a:p>
+        </p:txBody>
+      </p:sp>
+      <p:sp>
+        <p:nvSpPr>
+          <p:cNvPr id="3" name="Pladsholder til indhold 2">
+            <a:extLst>
+              <a:ext uri="{FF2B5EF4-FFF2-40B4-BE49-F238E27FC236}">
+                <a16:creationId xmlns:a16="http://schemas.microsoft.com/office/drawing/2014/main" id="{B63FF5E0-944C-409C-8FDC-9B24388982CB}"/>
+              </a:ext>
+            </a:extLst>
+          </p:cNvPr>
+          <p:cNvSpPr>
+            <a:spLocks noGrp="1"/>
+          </p:cNvSpPr>
+          <p:nvPr>
+            <p:ph idx="1"/>
+          </p:nvPr>
+        </p:nvSpPr>
+        <p:spPr>
+          <a:xfrm>
+            <a:off x="1103312" y="2052918"/>
+            <a:ext cx="8946541" cy="4195481"/>
+          </a:xfrm>
+        </p:spPr>
+        <p:txBody>
+          <a:bodyPr>
+            <a:normAutofit/>
+          </a:bodyPr>
+          <a:lstStyle/>
+          <a:p>
+            <a:endParaRPr lang="da-DK" dirty="0"/>
+          </a:p>
+          <a:p>
+            <a:endParaRPr lang="da-DK" dirty="0"/>
+          </a:p>
+          <a:p>
+            <a:endParaRPr lang="da-DK" dirty="0"/>
+          </a:p>
+          <a:p>
+            <a:endParaRPr lang="da-DK" dirty="0"/>
+          </a:p>
+          <a:p>
+            <a:endParaRPr lang="da-DK" dirty="0"/>
+          </a:p>
+          <a:p>
+            <a:endParaRPr lang="da-DK" dirty="0"/>
+          </a:p>
+          <a:p>
+            <a:endParaRPr lang="da-DK" sz="1600" dirty="0"/>
+          </a:p>
+          <a:p>
+            <a:pPr marL="0" indent="0">
+              <a:buNone/>
+            </a:pPr>
+            <a:r>
+              <a:rPr lang="da-DK" sz="1600" dirty="0"/>
+              <a:t>Den </a:t>
+            </a:r>
+            <a:r>
+              <a:rPr lang="da-DK" sz="1600" dirty="0" err="1"/>
+              <a:t>searchList</a:t>
+            </a:r>
+            <a:r>
+              <a:rPr lang="da-DK" sz="1600" dirty="0"/>
+              <a:t> fra controlleren bliver loopet igennem til et user objekt, og alle metoderne kan kaldes gennem </a:t>
+            </a:r>
+            <a:r>
+              <a:rPr lang="da-DK" sz="1600" dirty="0" err="1"/>
+              <a:t>thymeleaf</a:t>
+            </a:r>
+            <a:r>
+              <a:rPr lang="da-DK" sz="1600" dirty="0"/>
+              <a:t>. Så når vi skriver </a:t>
+            </a:r>
+            <a:r>
+              <a:rPr lang="da-DK" sz="1600" dirty="0" err="1"/>
+              <a:t>user.FirstName</a:t>
+            </a:r>
+            <a:r>
+              <a:rPr lang="da-DK" sz="1600" dirty="0"/>
+              <a:t> printes en tekst ud med fornavn på den person der er søgt efter.</a:t>
+            </a:r>
+            <a:br>
+              <a:rPr lang="da-DK" sz="1600" dirty="0"/>
+            </a:br>
+            <a:endParaRPr lang="da-DK" sz="1600" dirty="0"/>
           </a:p>
         </p:txBody>
       </p:sp>
       <p:pic>
         <p:nvPicPr>
-          <p:cNvPr id="4" name="Pladsholder til indhold 3">
+          <p:cNvPr id="4" name="Billede 3">
             <a:extLst>
               <a:ext uri="{FF2B5EF4-FFF2-40B4-BE49-F238E27FC236}">
-                <a16:creationId xmlns:a16="http://schemas.microsoft.com/office/drawing/2014/main" id="{D6A112EC-D356-47E3-A305-6B5724C6D584}"/>
+                <a16:creationId xmlns:a16="http://schemas.microsoft.com/office/drawing/2014/main" id="{7F3B8A28-CE0A-471D-B9C6-221A102275B7}"/>
               </a:ext>
             </a:extLst>
           </p:cNvPr>
           <p:cNvPicPr>
-            <a:picLocks noGrp="1" noChangeAspect="1"/>
+            <a:picLocks noChangeAspect="1"/>
           </p:cNvPicPr>
-          <p:nvPr>
-            <p:ph idx="1"/>
-          </p:nvPr>
+          <p:nvPr/>
         </p:nvPicPr>
         <p:blipFill>
           <a:blip r:embed="rId2"/>
@@ -6326,8 +6464,8 @@
         </p:blipFill>
         <p:spPr>
           <a:xfrm>
-            <a:off x="1233488" y="2131219"/>
-            <a:ext cx="8686800" cy="4038600"/>
+            <a:off x="374826" y="1188716"/>
+            <a:ext cx="9947292" cy="3816037"/>
           </a:xfrm>
           <a:prstGeom prst="rect">
             <a:avLst/>
@@ -6337,7 +6475,7 @@
     </p:spTree>
     <p:extLst>
       <p:ext uri="{BB962C8B-B14F-4D97-AF65-F5344CB8AC3E}">
-        <p14:creationId xmlns:p14="http://schemas.microsoft.com/office/powerpoint/2010/main" val="3191869660"/>
+        <p14:creationId xmlns:p14="http://schemas.microsoft.com/office/powerpoint/2010/main" val="2831913610"/>
       </p:ext>
     </p:extLst>
   </p:cSld>
@@ -6369,7 +6507,7 @@
           <p:cNvPr id="2" name="Titel 1">
             <a:extLst>
               <a:ext uri="{FF2B5EF4-FFF2-40B4-BE49-F238E27FC236}">
-                <a16:creationId xmlns:a16="http://schemas.microsoft.com/office/drawing/2014/main" id="{BC40C656-6233-4409-9415-1290DD3D8D24}"/>
+                <a16:creationId xmlns:a16="http://schemas.microsoft.com/office/drawing/2014/main" id="{6A9CA2F4-7485-416F-B198-962A485611BF}"/>
               </a:ext>
             </a:extLst>
           </p:cNvPr>
@@ -6385,48 +6523,26 @@
           <a:bodyPr/>
           <a:lstStyle/>
           <a:p>
-            <a:endParaRPr lang="da-DK"/>
+            <a:r>
+              <a:rPr lang="da-DK" dirty="0"/>
+              <a:t>Tag system – Phillip</a:t>
+            </a:r>
+            <a:br>
+              <a:rPr lang="da-DK" dirty="0"/>
+            </a:br>
+            <a:r>
+              <a:rPr lang="da-DK" dirty="0"/>
+              <a:t>userProfile.html</a:t>
+            </a:r>
           </a:p>
         </p:txBody>
       </p:sp>
       <p:pic>
         <p:nvPicPr>
-          <p:cNvPr id="5" name="Pladsholder til indhold 4">
+          <p:cNvPr id="4" name="Billede 3">
             <a:extLst>
               <a:ext uri="{FF2B5EF4-FFF2-40B4-BE49-F238E27FC236}">
-                <a16:creationId xmlns:a16="http://schemas.microsoft.com/office/drawing/2014/main" id="{E7E29E03-12B1-4E59-95BF-D928410F208D}"/>
-              </a:ext>
-            </a:extLst>
-          </p:cNvPr>
-          <p:cNvPicPr>
-            <a:picLocks noGrp="1" noChangeAspect="1"/>
-          </p:cNvPicPr>
-          <p:nvPr>
-            <p:ph idx="1"/>
-          </p:nvPr>
-        </p:nvPicPr>
-        <p:blipFill>
-          <a:blip r:embed="rId2"/>
-          <a:stretch>
-            <a:fillRect/>
-          </a:stretch>
-        </p:blipFill>
-        <p:spPr>
-          <a:xfrm>
-            <a:off x="352538" y="2400519"/>
-            <a:ext cx="10947316" cy="738109"/>
-          </a:xfrm>
-          <a:prstGeom prst="rect">
-            <a:avLst/>
-          </a:prstGeom>
-        </p:spPr>
-      </p:pic>
-      <p:pic>
-        <p:nvPicPr>
-          <p:cNvPr id="7" name="Billede 6">
-            <a:extLst>
-              <a:ext uri="{FF2B5EF4-FFF2-40B4-BE49-F238E27FC236}">
-                <a16:creationId xmlns:a16="http://schemas.microsoft.com/office/drawing/2014/main" id="{DEB0021D-FB2A-4AF7-899A-5D1709F6953D}"/>
+                <a16:creationId xmlns:a16="http://schemas.microsoft.com/office/drawing/2014/main" id="{29399E17-5A65-45E0-83AD-22196DA5F212}"/>
               </a:ext>
             </a:extLst>
           </p:cNvPr>
@@ -6436,15 +6552,15 @@
           <p:nvPr/>
         </p:nvPicPr>
         <p:blipFill>
-          <a:blip r:embed="rId3"/>
+          <a:blip r:embed="rId2"/>
           <a:stretch>
             <a:fillRect/>
           </a:stretch>
         </p:blipFill>
         <p:spPr>
           <a:xfrm>
-            <a:off x="352538" y="2845725"/>
-            <a:ext cx="10947316" cy="585805"/>
+            <a:off x="292329" y="2452737"/>
+            <a:ext cx="11283754" cy="3427382"/>
           </a:xfrm>
           <a:prstGeom prst="rect">
             <a:avLst/>
@@ -6454,7 +6570,7 @@
     </p:spTree>
     <p:extLst>
       <p:ext uri="{BB962C8B-B14F-4D97-AF65-F5344CB8AC3E}">
-        <p14:creationId xmlns:p14="http://schemas.microsoft.com/office/powerpoint/2010/main" val="971087820"/>
+        <p14:creationId xmlns:p14="http://schemas.microsoft.com/office/powerpoint/2010/main" val="3991629191"/>
       </p:ext>
     </p:extLst>
   </p:cSld>
@@ -6486,7 +6602,7 @@
           <p:cNvPr id="2" name="Titel 1">
             <a:extLst>
               <a:ext uri="{FF2B5EF4-FFF2-40B4-BE49-F238E27FC236}">
-                <a16:creationId xmlns:a16="http://schemas.microsoft.com/office/drawing/2014/main" id="{50ECE79F-C195-49E7-A5BD-0DB3E518C9DA}"/>
+                <a16:creationId xmlns:a16="http://schemas.microsoft.com/office/drawing/2014/main" id="{E599E423-A5E2-4EDD-8127-38E25F51F78F}"/>
               </a:ext>
             </a:extLst>
           </p:cNvPr>
@@ -6502,16 +6618,28 @@
           <a:bodyPr/>
           <a:lstStyle/>
           <a:p>
-            <a:endParaRPr lang="da-DK"/>
+            <a:r>
+              <a:rPr lang="da-DK" dirty="0" err="1"/>
+              <a:t>DemoController</a:t>
+            </a:r>
+            <a:r>
+              <a:rPr lang="da-DK" dirty="0"/>
+              <a:t> - </a:t>
+            </a:r>
+            <a:r>
+              <a:rPr lang="da-DK" dirty="0" err="1"/>
+              <a:t>PostMapping</a:t>
+            </a:r>
+            <a:endParaRPr lang="da-DK" dirty="0"/>
           </a:p>
         </p:txBody>
       </p:sp>
       <p:pic>
         <p:nvPicPr>
-          <p:cNvPr id="4" name="Billede 3">
+          <p:cNvPr id="6" name="Billede 5">
             <a:extLst>
               <a:ext uri="{FF2B5EF4-FFF2-40B4-BE49-F238E27FC236}">
-                <a16:creationId xmlns:a16="http://schemas.microsoft.com/office/drawing/2014/main" id="{C280E345-0168-4716-BFB3-B26F4293425B}"/>
+                <a16:creationId xmlns:a16="http://schemas.microsoft.com/office/drawing/2014/main" id="{1C6B6043-86B6-48D1-A2B3-8BFA280BD29E}"/>
               </a:ext>
             </a:extLst>
           </p:cNvPr>
@@ -6528,8 +6656,38 @@
         </p:blipFill>
         <p:spPr>
           <a:xfrm>
-            <a:off x="1811226" y="1243834"/>
-            <a:ext cx="7877522" cy="5251681"/>
+            <a:off x="1571809" y="1962150"/>
+            <a:ext cx="7553325" cy="1466850"/>
+          </a:xfrm>
+          <a:prstGeom prst="rect">
+            <a:avLst/>
+          </a:prstGeom>
+        </p:spPr>
+      </p:pic>
+      <p:pic>
+        <p:nvPicPr>
+          <p:cNvPr id="7" name="Billede 6">
+            <a:extLst>
+              <a:ext uri="{FF2B5EF4-FFF2-40B4-BE49-F238E27FC236}">
+                <a16:creationId xmlns:a16="http://schemas.microsoft.com/office/drawing/2014/main" id="{99896E23-8935-47AD-9A21-97E3EDED92D8}"/>
+              </a:ext>
+            </a:extLst>
+          </p:cNvPr>
+          <p:cNvPicPr>
+            <a:picLocks noChangeAspect="1"/>
+          </p:cNvPicPr>
+          <p:nvPr/>
+        </p:nvPicPr>
+        <p:blipFill>
+          <a:blip r:embed="rId3"/>
+          <a:stretch>
+            <a:fillRect/>
+          </a:stretch>
+        </p:blipFill>
+        <p:spPr>
+          <a:xfrm>
+            <a:off x="2386776" y="3856990"/>
+            <a:ext cx="5314950" cy="2295525"/>
           </a:xfrm>
           <a:prstGeom prst="rect">
             <a:avLst/>
@@ -6539,7 +6697,7 @@
     </p:spTree>
     <p:extLst>
       <p:ext uri="{BB962C8B-B14F-4D97-AF65-F5344CB8AC3E}">
-        <p14:creationId xmlns:p14="http://schemas.microsoft.com/office/powerpoint/2010/main" val="4011612521"/>
+        <p14:creationId xmlns:p14="http://schemas.microsoft.com/office/powerpoint/2010/main" val="3064781137"/>
       </p:ext>
     </p:extLst>
   </p:cSld>
@@ -6571,7 +6729,7 @@
           <p:cNvPr id="2" name="Titel 1">
             <a:extLst>
               <a:ext uri="{FF2B5EF4-FFF2-40B4-BE49-F238E27FC236}">
-                <a16:creationId xmlns:a16="http://schemas.microsoft.com/office/drawing/2014/main" id="{194A573D-E1B1-4B33-AF24-AE9BC845BD3A}"/>
+                <a16:creationId xmlns:a16="http://schemas.microsoft.com/office/drawing/2014/main" id="{E20FF6D1-F2C3-4287-A404-8EDE1A74B04D}"/>
               </a:ext>
             </a:extLst>
           </p:cNvPr>
@@ -6596,7 +6754,7 @@
           <p:cNvPr id="4" name="Pladsholder til indhold 3">
             <a:extLst>
               <a:ext uri="{FF2B5EF4-FFF2-40B4-BE49-F238E27FC236}">
-                <a16:creationId xmlns:a16="http://schemas.microsoft.com/office/drawing/2014/main" id="{A7875FE6-BFF7-4A36-B7AE-B9FF0C5DB50D}"/>
+                <a16:creationId xmlns:a16="http://schemas.microsoft.com/office/drawing/2014/main" id="{D6A112EC-D356-47E3-A305-6B5724C6D584}"/>
               </a:ext>
             </a:extLst>
           </p:cNvPr>
@@ -6615,8 +6773,8 @@
         </p:blipFill>
         <p:spPr>
           <a:xfrm>
-            <a:off x="1103313" y="2294169"/>
-            <a:ext cx="8947150" cy="3712700"/>
+            <a:off x="1233488" y="2131219"/>
+            <a:ext cx="8686800" cy="4038600"/>
           </a:xfrm>
           <a:prstGeom prst="rect">
             <a:avLst/>
@@ -6626,7 +6784,7 @@
     </p:spTree>
     <p:extLst>
       <p:ext uri="{BB962C8B-B14F-4D97-AF65-F5344CB8AC3E}">
-        <p14:creationId xmlns:p14="http://schemas.microsoft.com/office/powerpoint/2010/main" val="949776799"/>
+        <p14:creationId xmlns:p14="http://schemas.microsoft.com/office/powerpoint/2010/main" val="3191869660"/>
       </p:ext>
     </p:extLst>
   </p:cSld>
@@ -6658,6 +6816,295 @@
           <p:cNvPr id="2" name="Titel 1">
             <a:extLst>
               <a:ext uri="{FF2B5EF4-FFF2-40B4-BE49-F238E27FC236}">
+                <a16:creationId xmlns:a16="http://schemas.microsoft.com/office/drawing/2014/main" id="{BC40C656-6233-4409-9415-1290DD3D8D24}"/>
+              </a:ext>
+            </a:extLst>
+          </p:cNvPr>
+          <p:cNvSpPr>
+            <a:spLocks noGrp="1"/>
+          </p:cNvSpPr>
+          <p:nvPr>
+            <p:ph type="title"/>
+          </p:nvPr>
+        </p:nvSpPr>
+        <p:spPr/>
+        <p:txBody>
+          <a:bodyPr/>
+          <a:lstStyle/>
+          <a:p>
+            <a:endParaRPr lang="da-DK"/>
+          </a:p>
+        </p:txBody>
+      </p:sp>
+      <p:pic>
+        <p:nvPicPr>
+          <p:cNvPr id="5" name="Pladsholder til indhold 4">
+            <a:extLst>
+              <a:ext uri="{FF2B5EF4-FFF2-40B4-BE49-F238E27FC236}">
+                <a16:creationId xmlns:a16="http://schemas.microsoft.com/office/drawing/2014/main" id="{E7E29E03-12B1-4E59-95BF-D928410F208D}"/>
+              </a:ext>
+            </a:extLst>
+          </p:cNvPr>
+          <p:cNvPicPr>
+            <a:picLocks noGrp="1" noChangeAspect="1"/>
+          </p:cNvPicPr>
+          <p:nvPr>
+            <p:ph idx="1"/>
+          </p:nvPr>
+        </p:nvPicPr>
+        <p:blipFill>
+          <a:blip r:embed="rId2"/>
+          <a:stretch>
+            <a:fillRect/>
+          </a:stretch>
+        </p:blipFill>
+        <p:spPr>
+          <a:xfrm>
+            <a:off x="352538" y="2400519"/>
+            <a:ext cx="10947316" cy="738109"/>
+          </a:xfrm>
+          <a:prstGeom prst="rect">
+            <a:avLst/>
+          </a:prstGeom>
+        </p:spPr>
+      </p:pic>
+      <p:pic>
+        <p:nvPicPr>
+          <p:cNvPr id="7" name="Billede 6">
+            <a:extLst>
+              <a:ext uri="{FF2B5EF4-FFF2-40B4-BE49-F238E27FC236}">
+                <a16:creationId xmlns:a16="http://schemas.microsoft.com/office/drawing/2014/main" id="{DEB0021D-FB2A-4AF7-899A-5D1709F6953D}"/>
+              </a:ext>
+            </a:extLst>
+          </p:cNvPr>
+          <p:cNvPicPr>
+            <a:picLocks noChangeAspect="1"/>
+          </p:cNvPicPr>
+          <p:nvPr/>
+        </p:nvPicPr>
+        <p:blipFill>
+          <a:blip r:embed="rId3"/>
+          <a:stretch>
+            <a:fillRect/>
+          </a:stretch>
+        </p:blipFill>
+        <p:spPr>
+          <a:xfrm>
+            <a:off x="352538" y="2845725"/>
+            <a:ext cx="10947316" cy="585805"/>
+          </a:xfrm>
+          <a:prstGeom prst="rect">
+            <a:avLst/>
+          </a:prstGeom>
+        </p:spPr>
+      </p:pic>
+    </p:spTree>
+    <p:extLst>
+      <p:ext uri="{BB962C8B-B14F-4D97-AF65-F5344CB8AC3E}">
+        <p14:creationId xmlns:p14="http://schemas.microsoft.com/office/powerpoint/2010/main" val="971087820"/>
+      </p:ext>
+    </p:extLst>
+  </p:cSld>
+  <p:clrMapOvr>
+    <a:masterClrMapping/>
+  </p:clrMapOvr>
+</p:sld>
+</file>
+
+<file path=ppt/slides/slide16.xml><?xml version="1.0" encoding="utf-8"?>
+<p:sld xmlns:a="http://schemas.openxmlformats.org/drawingml/2006/main" xmlns:r="http://schemas.openxmlformats.org/officeDocument/2006/relationships" xmlns:p="http://schemas.openxmlformats.org/presentationml/2006/main">
+  <p:cSld>
+    <p:spTree>
+      <p:nvGrpSpPr>
+        <p:cNvPr id="1" name=""/>
+        <p:cNvGrpSpPr/>
+        <p:nvPr/>
+      </p:nvGrpSpPr>
+      <p:grpSpPr>
+        <a:xfrm>
+          <a:off x="0" y="0"/>
+          <a:ext cx="0" cy="0"/>
+          <a:chOff x="0" y="0"/>
+          <a:chExt cx="0" cy="0"/>
+        </a:xfrm>
+      </p:grpSpPr>
+      <p:sp>
+        <p:nvSpPr>
+          <p:cNvPr id="2" name="Titel 1">
+            <a:extLst>
+              <a:ext uri="{FF2B5EF4-FFF2-40B4-BE49-F238E27FC236}">
+                <a16:creationId xmlns:a16="http://schemas.microsoft.com/office/drawing/2014/main" id="{50ECE79F-C195-49E7-A5BD-0DB3E518C9DA}"/>
+              </a:ext>
+            </a:extLst>
+          </p:cNvPr>
+          <p:cNvSpPr>
+            <a:spLocks noGrp="1"/>
+          </p:cNvSpPr>
+          <p:nvPr>
+            <p:ph type="title"/>
+          </p:nvPr>
+        </p:nvSpPr>
+        <p:spPr/>
+        <p:txBody>
+          <a:bodyPr/>
+          <a:lstStyle/>
+          <a:p>
+            <a:endParaRPr lang="da-DK"/>
+          </a:p>
+        </p:txBody>
+      </p:sp>
+      <p:pic>
+        <p:nvPicPr>
+          <p:cNvPr id="4" name="Billede 3">
+            <a:extLst>
+              <a:ext uri="{FF2B5EF4-FFF2-40B4-BE49-F238E27FC236}">
+                <a16:creationId xmlns:a16="http://schemas.microsoft.com/office/drawing/2014/main" id="{C280E345-0168-4716-BFB3-B26F4293425B}"/>
+              </a:ext>
+            </a:extLst>
+          </p:cNvPr>
+          <p:cNvPicPr>
+            <a:picLocks noChangeAspect="1"/>
+          </p:cNvPicPr>
+          <p:nvPr/>
+        </p:nvPicPr>
+        <p:blipFill>
+          <a:blip r:embed="rId2"/>
+          <a:stretch>
+            <a:fillRect/>
+          </a:stretch>
+        </p:blipFill>
+        <p:spPr>
+          <a:xfrm>
+            <a:off x="1811226" y="1243834"/>
+            <a:ext cx="7877522" cy="5251681"/>
+          </a:xfrm>
+          <a:prstGeom prst="rect">
+            <a:avLst/>
+          </a:prstGeom>
+        </p:spPr>
+      </p:pic>
+    </p:spTree>
+    <p:extLst>
+      <p:ext uri="{BB962C8B-B14F-4D97-AF65-F5344CB8AC3E}">
+        <p14:creationId xmlns:p14="http://schemas.microsoft.com/office/powerpoint/2010/main" val="4011612521"/>
+      </p:ext>
+    </p:extLst>
+  </p:cSld>
+  <p:clrMapOvr>
+    <a:masterClrMapping/>
+  </p:clrMapOvr>
+</p:sld>
+</file>
+
+<file path=ppt/slides/slide17.xml><?xml version="1.0" encoding="utf-8"?>
+<p:sld xmlns:a="http://schemas.openxmlformats.org/drawingml/2006/main" xmlns:r="http://schemas.openxmlformats.org/officeDocument/2006/relationships" xmlns:p="http://schemas.openxmlformats.org/presentationml/2006/main">
+  <p:cSld>
+    <p:spTree>
+      <p:nvGrpSpPr>
+        <p:cNvPr id="1" name=""/>
+        <p:cNvGrpSpPr/>
+        <p:nvPr/>
+      </p:nvGrpSpPr>
+      <p:grpSpPr>
+        <a:xfrm>
+          <a:off x="0" y="0"/>
+          <a:ext cx="0" cy="0"/>
+          <a:chOff x="0" y="0"/>
+          <a:chExt cx="0" cy="0"/>
+        </a:xfrm>
+      </p:grpSpPr>
+      <p:sp>
+        <p:nvSpPr>
+          <p:cNvPr id="2" name="Titel 1">
+            <a:extLst>
+              <a:ext uri="{FF2B5EF4-FFF2-40B4-BE49-F238E27FC236}">
+                <a16:creationId xmlns:a16="http://schemas.microsoft.com/office/drawing/2014/main" id="{194A573D-E1B1-4B33-AF24-AE9BC845BD3A}"/>
+              </a:ext>
+            </a:extLst>
+          </p:cNvPr>
+          <p:cNvSpPr>
+            <a:spLocks noGrp="1"/>
+          </p:cNvSpPr>
+          <p:nvPr>
+            <p:ph type="title"/>
+          </p:nvPr>
+        </p:nvSpPr>
+        <p:spPr/>
+        <p:txBody>
+          <a:bodyPr/>
+          <a:lstStyle/>
+          <a:p>
+            <a:endParaRPr lang="da-DK"/>
+          </a:p>
+        </p:txBody>
+      </p:sp>
+      <p:pic>
+        <p:nvPicPr>
+          <p:cNvPr id="4" name="Pladsholder til indhold 3">
+            <a:extLst>
+              <a:ext uri="{FF2B5EF4-FFF2-40B4-BE49-F238E27FC236}">
+                <a16:creationId xmlns:a16="http://schemas.microsoft.com/office/drawing/2014/main" id="{A7875FE6-BFF7-4A36-B7AE-B9FF0C5DB50D}"/>
+              </a:ext>
+            </a:extLst>
+          </p:cNvPr>
+          <p:cNvPicPr>
+            <a:picLocks noGrp="1" noChangeAspect="1"/>
+          </p:cNvPicPr>
+          <p:nvPr>
+            <p:ph idx="1"/>
+          </p:nvPr>
+        </p:nvPicPr>
+        <p:blipFill>
+          <a:blip r:embed="rId2"/>
+          <a:stretch>
+            <a:fillRect/>
+          </a:stretch>
+        </p:blipFill>
+        <p:spPr>
+          <a:xfrm>
+            <a:off x="1103313" y="2294169"/>
+            <a:ext cx="8947150" cy="3712700"/>
+          </a:xfrm>
+          <a:prstGeom prst="rect">
+            <a:avLst/>
+          </a:prstGeom>
+        </p:spPr>
+      </p:pic>
+    </p:spTree>
+    <p:extLst>
+      <p:ext uri="{BB962C8B-B14F-4D97-AF65-F5344CB8AC3E}">
+        <p14:creationId xmlns:p14="http://schemas.microsoft.com/office/powerpoint/2010/main" val="949776799"/>
+      </p:ext>
+    </p:extLst>
+  </p:cSld>
+  <p:clrMapOvr>
+    <a:masterClrMapping/>
+  </p:clrMapOvr>
+</p:sld>
+</file>
+
+<file path=ppt/slides/slide18.xml><?xml version="1.0" encoding="utf-8"?>
+<p:sld xmlns:a="http://schemas.openxmlformats.org/drawingml/2006/main" xmlns:r="http://schemas.openxmlformats.org/officeDocument/2006/relationships" xmlns:p="http://schemas.openxmlformats.org/presentationml/2006/main">
+  <p:cSld>
+    <p:spTree>
+      <p:nvGrpSpPr>
+        <p:cNvPr id="1" name=""/>
+        <p:cNvGrpSpPr/>
+        <p:nvPr/>
+      </p:nvGrpSpPr>
+      <p:grpSpPr>
+        <a:xfrm>
+          <a:off x="0" y="0"/>
+          <a:ext cx="0" cy="0"/>
+          <a:chOff x="0" y="0"/>
+          <a:chExt cx="0" cy="0"/>
+        </a:xfrm>
+      </p:grpSpPr>
+      <p:sp>
+        <p:nvSpPr>
+          <p:cNvPr id="2" name="Titel 1">
+            <a:extLst>
+              <a:ext uri="{FF2B5EF4-FFF2-40B4-BE49-F238E27FC236}">
                 <a16:creationId xmlns:a16="http://schemas.microsoft.com/office/drawing/2014/main" id="{426BA3BD-814D-4C74-9B2F-73E5978BBF89}"/>
               </a:ext>
             </a:extLst>
@@ -6722,6 +7169,29 @@
 <file path=ppt/slides/slide2.xml><?xml version="1.0" encoding="utf-8"?>
 <p:sld xmlns:a="http://schemas.openxmlformats.org/drawingml/2006/main" xmlns:r="http://schemas.openxmlformats.org/officeDocument/2006/relationships" xmlns:p="http://schemas.openxmlformats.org/presentationml/2006/main">
   <p:cSld>
+    <p:bg>
+      <p:bgPr>
+        <a:blipFill rotWithShape="1">
+          <a:blip r:embed="rId2">
+            <a:duotone>
+              <a:schemeClr val="bg2">
+                <a:shade val="69000"/>
+                <a:hueMod val="91000"/>
+                <a:satMod val="164000"/>
+                <a:lumMod val="74000"/>
+              </a:schemeClr>
+              <a:schemeClr val="bg2">
+                <a:hueMod val="124000"/>
+                <a:satMod val="140000"/>
+                <a:lumMod val="142000"/>
+              </a:schemeClr>
+            </a:duotone>
+          </a:blip>
+          <a:stretch/>
+        </a:blipFill>
+        <a:effectLst/>
+      </p:bgPr>
+    </p:bg>
     <p:spTree>
       <p:nvGrpSpPr>
         <p:cNvPr id="1" name=""/>
@@ -6736,12 +7206,315 @@
           <a:chExt cx="0" cy="0"/>
         </a:xfrm>
       </p:grpSpPr>
+      <p:pic>
+        <p:nvPicPr>
+          <p:cNvPr id="16" name="Picture 15">
+            <a:extLst>
+              <a:ext uri="{FF2B5EF4-FFF2-40B4-BE49-F238E27FC236}">
+                <a16:creationId xmlns:a16="http://schemas.microsoft.com/office/drawing/2014/main" id="{8B6CEEE2-F04A-4495-BAA5-41ADC79BDBF6}"/>
+              </a:ext>
+              <a:ext uri="{C183D7F6-B498-43B3-948B-1728B52AA6E4}">
+                <adec:decorative xmlns:adec="http://schemas.microsoft.com/office/drawing/2017/decorative" val="1"/>
+              </a:ext>
+            </a:extLst>
+          </p:cNvPr>
+          <p:cNvPicPr>
+            <a:picLocks noGrp="1" noRot="1" noChangeAspect="1" noMove="1" noResize="1" noEditPoints="1" noAdjustHandles="1" noChangeArrowheads="1" noChangeShapeType="1" noCrop="1"/>
+          </p:cNvPicPr>
+          <p:nvPr>
+            <p:extLst>
+              <p:ext uri="{386F3935-93C4-4BCD-93E2-E3B085C9AB24}">
+                <p16:designElem xmlns:p16="http://schemas.microsoft.com/office/powerpoint/2015/main" val="1"/>
+              </p:ext>
+            </p:extLst>
+          </p:nvPr>
+        </p:nvPicPr>
+        <p:blipFill rotWithShape="1">
+          <a:blip r:embed="rId3">
+            <a:extLst>
+              <a:ext uri="{28A0092B-C50C-407E-A947-70E740481C1C}">
+                <a14:useLocalDpi xmlns:a14="http://schemas.microsoft.com/office/drawing/2010/main" val="0"/>
+              </a:ext>
+            </a:extLst>
+          </a:blip>
+          <a:srcRect l="3644"/>
+          <a:stretch/>
+        </p:blipFill>
+        <p:spPr>
+          <a:xfrm>
+            <a:off x="0" y="2669685"/>
+            <a:ext cx="4035669" cy="4188315"/>
+          </a:xfrm>
+          <a:prstGeom prst="rect">
+            <a:avLst/>
+          </a:prstGeom>
+        </p:spPr>
+      </p:pic>
+      <p:pic>
+        <p:nvPicPr>
+          <p:cNvPr id="18" name="Picture 17">
+            <a:extLst>
+              <a:ext uri="{FF2B5EF4-FFF2-40B4-BE49-F238E27FC236}">
+                <a16:creationId xmlns:a16="http://schemas.microsoft.com/office/drawing/2014/main" id="{534DD426-4D43-43D2-BEFD-ED65D6CA127A}"/>
+              </a:ext>
+              <a:ext uri="{C183D7F6-B498-43B3-948B-1728B52AA6E4}">
+                <adec:decorative xmlns:adec="http://schemas.microsoft.com/office/drawing/2017/decorative" val="1"/>
+              </a:ext>
+            </a:extLst>
+          </p:cNvPr>
+          <p:cNvPicPr>
+            <a:picLocks noGrp="1" noRot="1" noChangeAspect="1" noMove="1" noResize="1" noEditPoints="1" noAdjustHandles="1" noChangeArrowheads="1" noChangeShapeType="1" noCrop="1"/>
+          </p:cNvPicPr>
+          <p:nvPr>
+            <p:extLst>
+              <p:ext uri="{386F3935-93C4-4BCD-93E2-E3B085C9AB24}">
+                <p16:designElem xmlns:p16="http://schemas.microsoft.com/office/powerpoint/2015/main" val="1"/>
+              </p:ext>
+            </p:extLst>
+          </p:nvPr>
+        </p:nvPicPr>
+        <p:blipFill rotWithShape="1">
+          <a:blip r:embed="rId4">
+            <a:extLst>
+              <a:ext uri="{28A0092B-C50C-407E-A947-70E740481C1C}">
+                <a14:useLocalDpi xmlns:a14="http://schemas.microsoft.com/office/drawing/2010/main" val="0"/>
+              </a:ext>
+            </a:extLst>
+          </a:blip>
+          <a:srcRect l="35640"/>
+          <a:stretch/>
+        </p:blipFill>
+        <p:spPr>
+          <a:xfrm>
+            <a:off x="0" y="2892347"/>
+            <a:ext cx="1522412" cy="2365453"/>
+          </a:xfrm>
+          <a:prstGeom prst="rect">
+            <a:avLst/>
+          </a:prstGeom>
+        </p:spPr>
+      </p:pic>
+      <p:sp>
+        <p:nvSpPr>
+          <p:cNvPr id="20" name="Oval 19">
+            <a:extLst>
+              <a:ext uri="{FF2B5EF4-FFF2-40B4-BE49-F238E27FC236}">
+                <a16:creationId xmlns:a16="http://schemas.microsoft.com/office/drawing/2014/main" id="{DD419DCE-20CD-483A-A34D-DDA94B2B0025}"/>
+              </a:ext>
+              <a:ext uri="{C183D7F6-B498-43B3-948B-1728B52AA6E4}">
+                <adec:decorative xmlns:adec="http://schemas.microsoft.com/office/drawing/2017/decorative" val="1"/>
+              </a:ext>
+            </a:extLst>
+          </p:cNvPr>
+          <p:cNvSpPr>
+            <a:spLocks noGrp="1" noRot="1" noChangeAspect="1" noMove="1" noResize="1" noEditPoints="1" noAdjustHandles="1" noChangeArrowheads="1" noChangeShapeType="1" noTextEdit="1"/>
+          </p:cNvSpPr>
+          <p:nvPr>
+            <p:extLst>
+              <p:ext uri="{386F3935-93C4-4BCD-93E2-E3B085C9AB24}">
+                <p16:designElem xmlns:p16="http://schemas.microsoft.com/office/powerpoint/2015/main" val="1"/>
+              </p:ext>
+            </p:extLst>
+          </p:nvPr>
+        </p:nvSpPr>
+        <p:spPr>
+          <a:xfrm>
+            <a:off x="8609012" y="1676400"/>
+            <a:ext cx="2819400" cy="2819400"/>
+          </a:xfrm>
+          <a:prstGeom prst="ellipse">
+            <a:avLst/>
+          </a:prstGeom>
+          <a:gradFill flip="none" rotWithShape="1">
+            <a:gsLst>
+              <a:gs pos="0">
+                <a:schemeClr val="accent5">
+                  <a:alpha val="7000"/>
+                </a:schemeClr>
+              </a:gs>
+              <a:gs pos="69000">
+                <a:schemeClr val="accent5">
+                  <a:alpha val="0"/>
+                </a:schemeClr>
+              </a:gs>
+              <a:gs pos="36000">
+                <a:schemeClr val="accent5">
+                  <a:alpha val="6000"/>
+                </a:schemeClr>
+              </a:gs>
+            </a:gsLst>
+            <a:path path="circle">
+              <a:fillToRect l="50000" t="50000" r="50000" b="50000"/>
+            </a:path>
+            <a:tileRect/>
+          </a:gradFill>
+          <a:ln>
+            <a:noFill/>
+          </a:ln>
+          <a:effectLst/>
+        </p:spPr>
+        <p:style>
+          <a:lnRef idx="1">
+            <a:schemeClr val="accent1"/>
+          </a:lnRef>
+          <a:fillRef idx="3">
+            <a:schemeClr val="accent1"/>
+          </a:fillRef>
+          <a:effectRef idx="2">
+            <a:schemeClr val="accent1"/>
+          </a:effectRef>
+          <a:fontRef idx="minor">
+            <a:schemeClr val="lt1"/>
+          </a:fontRef>
+        </p:style>
+      </p:sp>
+      <p:pic>
+        <p:nvPicPr>
+          <p:cNvPr id="22" name="Picture 21">
+            <a:extLst>
+              <a:ext uri="{FF2B5EF4-FFF2-40B4-BE49-F238E27FC236}">
+                <a16:creationId xmlns:a16="http://schemas.microsoft.com/office/drawing/2014/main" id="{75BBAA3E-B261-431F-9672-A48853A5138E}"/>
+              </a:ext>
+              <a:ext uri="{C183D7F6-B498-43B3-948B-1728B52AA6E4}">
+                <adec:decorative xmlns:adec="http://schemas.microsoft.com/office/drawing/2017/decorative" val="1"/>
+              </a:ext>
+            </a:extLst>
+          </p:cNvPr>
+          <p:cNvPicPr>
+            <a:picLocks noGrp="1" noRot="1" noChangeAspect="1" noMove="1" noResize="1" noEditPoints="1" noAdjustHandles="1" noChangeArrowheads="1" noChangeShapeType="1" noCrop="1"/>
+          </p:cNvPicPr>
+          <p:nvPr>
+            <p:extLst>
+              <p:ext uri="{386F3935-93C4-4BCD-93E2-E3B085C9AB24}">
+                <p16:designElem xmlns:p16="http://schemas.microsoft.com/office/powerpoint/2015/main" val="1"/>
+              </p:ext>
+            </p:extLst>
+          </p:nvPr>
+        </p:nvPicPr>
+        <p:blipFill rotWithShape="1">
+          <a:blip r:embed="rId5">
+            <a:extLst>
+              <a:ext uri="{28A0092B-C50C-407E-A947-70E740481C1C}">
+                <a14:useLocalDpi xmlns:a14="http://schemas.microsoft.com/office/drawing/2010/main" val="0"/>
+              </a:ext>
+            </a:extLst>
+          </a:blip>
+          <a:srcRect t="28813"/>
+          <a:stretch/>
+        </p:blipFill>
+        <p:spPr>
+          <a:xfrm>
+            <a:off x="7999412" y="0"/>
+            <a:ext cx="1603387" cy="1141407"/>
+          </a:xfrm>
+          <a:prstGeom prst="rect">
+            <a:avLst/>
+          </a:prstGeom>
+        </p:spPr>
+      </p:pic>
+      <p:pic>
+        <p:nvPicPr>
+          <p:cNvPr id="24" name="Picture 23">
+            <a:extLst>
+              <a:ext uri="{FF2B5EF4-FFF2-40B4-BE49-F238E27FC236}">
+                <a16:creationId xmlns:a16="http://schemas.microsoft.com/office/drawing/2014/main" id="{3A27BFFC-8090-4322-BE46-86AED6BCFFDC}"/>
+              </a:ext>
+              <a:ext uri="{C183D7F6-B498-43B3-948B-1728B52AA6E4}">
+                <adec:decorative xmlns:adec="http://schemas.microsoft.com/office/drawing/2017/decorative" val="1"/>
+              </a:ext>
+            </a:extLst>
+          </p:cNvPr>
+          <p:cNvPicPr>
+            <a:picLocks noGrp="1" noRot="1" noChangeAspect="1" noMove="1" noResize="1" noEditPoints="1" noAdjustHandles="1" noChangeArrowheads="1" noChangeShapeType="1" noCrop="1"/>
+          </p:cNvPicPr>
+          <p:nvPr>
+            <p:extLst>
+              <p:ext uri="{386F3935-93C4-4BCD-93E2-E3B085C9AB24}">
+                <p16:designElem xmlns:p16="http://schemas.microsoft.com/office/powerpoint/2015/main" val="1"/>
+              </p:ext>
+            </p:extLst>
+          </p:nvPr>
+        </p:nvPicPr>
+        <p:blipFill rotWithShape="1">
+          <a:blip r:embed="rId6">
+            <a:extLst>
+              <a:ext uri="{28A0092B-C50C-407E-A947-70E740481C1C}">
+                <a14:useLocalDpi xmlns:a14="http://schemas.microsoft.com/office/drawing/2010/main" val="0"/>
+              </a:ext>
+            </a:extLst>
+          </a:blip>
+          <a:srcRect b="23320"/>
+          <a:stretch/>
+        </p:blipFill>
+        <p:spPr>
+          <a:xfrm>
+            <a:off x="8609012" y="6096000"/>
+            <a:ext cx="993734" cy="762000"/>
+          </a:xfrm>
+          <a:prstGeom prst="rect">
+            <a:avLst/>
+          </a:prstGeom>
+        </p:spPr>
+      </p:pic>
+      <p:sp>
+        <p:nvSpPr>
+          <p:cNvPr id="26" name="Rectangle 25">
+            <a:extLst>
+              <a:ext uri="{FF2B5EF4-FFF2-40B4-BE49-F238E27FC236}">
+                <a16:creationId xmlns:a16="http://schemas.microsoft.com/office/drawing/2014/main" id="{F0E43693-1F05-4B93-A429-6944E009925E}"/>
+              </a:ext>
+              <a:ext uri="{C183D7F6-B498-43B3-948B-1728B52AA6E4}">
+                <adec:decorative xmlns:adec="http://schemas.microsoft.com/office/drawing/2017/decorative" val="1"/>
+              </a:ext>
+            </a:extLst>
+          </p:cNvPr>
+          <p:cNvSpPr>
+            <a:spLocks noGrp="1" noRot="1" noChangeAspect="1" noMove="1" noResize="1" noEditPoints="1" noAdjustHandles="1" noChangeArrowheads="1" noChangeShapeType="1" noTextEdit="1"/>
+          </p:cNvSpPr>
+          <p:nvPr>
+            <p:extLst>
+              <p:ext uri="{386F3935-93C4-4BCD-93E2-E3B085C9AB24}">
+                <p16:designElem xmlns:p16="http://schemas.microsoft.com/office/powerpoint/2015/main" val="1"/>
+              </p:ext>
+            </p:extLst>
+          </p:nvPr>
+        </p:nvSpPr>
+        <p:spPr>
+          <a:xfrm>
+            <a:off x="10437812" y="0"/>
+            <a:ext cx="685800" cy="1143000"/>
+          </a:xfrm>
+          <a:prstGeom prst="rect">
+            <a:avLst/>
+          </a:prstGeom>
+          <a:solidFill>
+            <a:schemeClr val="accent1"/>
+          </a:solidFill>
+          <a:ln>
+            <a:noFill/>
+          </a:ln>
+        </p:spPr>
+        <p:style>
+          <a:lnRef idx="1">
+            <a:schemeClr val="accent1"/>
+          </a:lnRef>
+          <a:fillRef idx="3">
+            <a:schemeClr val="accent1"/>
+          </a:fillRef>
+          <a:effectRef idx="2">
+            <a:schemeClr val="accent1"/>
+          </a:effectRef>
+          <a:fontRef idx="minor">
+            <a:schemeClr val="lt1"/>
+          </a:fontRef>
+        </p:style>
+      </p:sp>
       <p:sp>
         <p:nvSpPr>
           <p:cNvPr id="2" name="Titel 1">
             <a:extLst>
               <a:ext uri="{FF2B5EF4-FFF2-40B4-BE49-F238E27FC236}">
-                <a16:creationId xmlns:a16="http://schemas.microsoft.com/office/drawing/2014/main" id="{DF6A03A1-90E1-44F9-94A6-9FB75598A111}"/>
+                <a16:creationId xmlns:a16="http://schemas.microsoft.com/office/drawing/2014/main" id="{E54DDD20-8D33-426C-89AB-041C517CD7AA}"/>
               </a:ext>
             </a:extLst>
           </p:cNvPr>
@@ -6752,47 +7525,199 @@
             <p:ph type="title"/>
           </p:nvPr>
         </p:nvSpPr>
-        <p:spPr/>
-        <p:txBody>
-          <a:bodyPr/>
+        <p:spPr>
+          <a:xfrm>
+            <a:off x="635458" y="4542502"/>
+            <a:ext cx="9181185" cy="1189985"/>
+          </a:xfrm>
+        </p:spPr>
+        <p:txBody>
+          <a:bodyPr vert="horz" lIns="91440" tIns="45720" rIns="91440" bIns="45720" rtlCol="0" anchor="b">
+            <a:normAutofit/>
+          </a:bodyPr>
           <a:lstStyle/>
           <a:p>
             <a:r>
-              <a:rPr lang="da-DK" dirty="0"/>
+              <a:rPr lang="en-US" sz="6500" dirty="0"/>
               <a:t>Prototype</a:t>
             </a:r>
           </a:p>
         </p:txBody>
       </p:sp>
-      <p:sp>
-        <p:nvSpPr>
-          <p:cNvPr id="3" name="Pladsholder til indhold 2">
+      <p:pic>
+        <p:nvPicPr>
+          <p:cNvPr id="9" name="Billede 8" descr="Et billede, der indeholder tekst, whiteboard&#10;&#10;Automatisk genereret beskrivelse">
             <a:extLst>
               <a:ext uri="{FF2B5EF4-FFF2-40B4-BE49-F238E27FC236}">
-                <a16:creationId xmlns:a16="http://schemas.microsoft.com/office/drawing/2014/main" id="{49C23FC2-5739-4C87-AED0-06C8A1D453BB}"/>
+                <a16:creationId xmlns:a16="http://schemas.microsoft.com/office/drawing/2014/main" id="{47814AE2-5915-4621-99EE-192E1966E448}"/>
               </a:ext>
             </a:extLst>
           </p:cNvPr>
-          <p:cNvSpPr>
-            <a:spLocks noGrp="1"/>
-          </p:cNvSpPr>
+          <p:cNvPicPr>
+            <a:picLocks noChangeAspect="1"/>
+          </p:cNvPicPr>
+          <p:nvPr/>
+        </p:nvPicPr>
+        <p:blipFill rotWithShape="1">
+          <a:blip r:embed="rId7">
+            <a:extLst>
+              <a:ext uri="{28A0092B-C50C-407E-A947-70E740481C1C}">
+                <a14:useLocalDpi xmlns:a14="http://schemas.microsoft.com/office/drawing/2010/main" val="0"/>
+              </a:ext>
+            </a:extLst>
+          </a:blip>
+          <a:srcRect l="5542" r="6275" b="2"/>
+          <a:stretch/>
+        </p:blipFill>
+        <p:spPr>
+          <a:xfrm>
+            <a:off x="3339948" y="67545"/>
+            <a:ext cx="2869769" cy="4750794"/>
+          </a:xfrm>
+          <a:prstGeom prst="rect">
+            <a:avLst/>
+          </a:prstGeom>
+          <a:effectLst>
+            <a:outerShdw blurRad="50800" dist="38100" dir="5400000" algn="t" rotWithShape="0">
+              <a:prstClr val="black">
+                <a:alpha val="43000"/>
+              </a:prstClr>
+            </a:outerShdw>
+          </a:effectLst>
+        </p:spPr>
+      </p:pic>
+      <p:pic>
+        <p:nvPicPr>
+          <p:cNvPr id="7" name="Billede 6" descr="Et billede, der indeholder tekst&#10;&#10;Automatisk genereret beskrivelse">
+            <a:extLst>
+              <a:ext uri="{FF2B5EF4-FFF2-40B4-BE49-F238E27FC236}">
+                <a16:creationId xmlns:a16="http://schemas.microsoft.com/office/drawing/2014/main" id="{CD7AF9C4-B84D-4DC9-BDF3-063E13A7BA1B}"/>
+              </a:ext>
+            </a:extLst>
+          </p:cNvPr>
+          <p:cNvPicPr>
+            <a:picLocks noChangeAspect="1"/>
+          </p:cNvPicPr>
+          <p:nvPr/>
+        </p:nvPicPr>
+        <p:blipFill rotWithShape="1">
+          <a:blip r:embed="rId8">
+            <a:extLst>
+              <a:ext uri="{28A0092B-C50C-407E-A947-70E740481C1C}">
+                <a14:useLocalDpi xmlns:a14="http://schemas.microsoft.com/office/drawing/2010/main" val="0"/>
+              </a:ext>
+            </a:extLst>
+          </a:blip>
+          <a:srcRect r="8477" b="2"/>
+          <a:stretch/>
+        </p:blipFill>
+        <p:spPr>
+          <a:xfrm>
+            <a:off x="6287847" y="510139"/>
+            <a:ext cx="2445605" cy="4048607"/>
+          </a:xfrm>
+          <a:prstGeom prst="rect">
+            <a:avLst/>
+          </a:prstGeom>
+          <a:effectLst>
+            <a:outerShdw blurRad="50800" dist="38100" dir="5400000" algn="t" rotWithShape="0">
+              <a:prstClr val="black">
+                <a:alpha val="43000"/>
+              </a:prstClr>
+            </a:outerShdw>
+          </a:effectLst>
+        </p:spPr>
+      </p:pic>
+      <p:pic>
+        <p:nvPicPr>
+          <p:cNvPr id="11" name="Billede 10">
+            <a:extLst>
+              <a:ext uri="{FF2B5EF4-FFF2-40B4-BE49-F238E27FC236}">
+                <a16:creationId xmlns:a16="http://schemas.microsoft.com/office/drawing/2014/main" id="{37D54FA7-25A2-44A5-A9DA-D93AF1C6E4C7}"/>
+              </a:ext>
+            </a:extLst>
+          </p:cNvPr>
+          <p:cNvPicPr>
+            <a:picLocks noChangeAspect="1"/>
+          </p:cNvPicPr>
+          <p:nvPr/>
+        </p:nvPicPr>
+        <p:blipFill rotWithShape="1">
+          <a:blip r:embed="rId9">
+            <a:extLst>
+              <a:ext uri="{28A0092B-C50C-407E-A947-70E740481C1C}">
+                <a14:useLocalDpi xmlns:a14="http://schemas.microsoft.com/office/drawing/2010/main" val="0"/>
+              </a:ext>
+            </a:extLst>
+          </a:blip>
+          <a:srcRect l="9773" r="4241" b="2"/>
+          <a:stretch/>
+        </p:blipFill>
+        <p:spPr>
+          <a:xfrm>
+            <a:off x="338959" y="67545"/>
+            <a:ext cx="2869769" cy="4750795"/>
+          </a:xfrm>
+          <a:prstGeom prst="rect">
+            <a:avLst/>
+          </a:prstGeom>
+          <a:effectLst>
+            <a:outerShdw blurRad="50800" dist="38100" dir="5400000" algn="t" rotWithShape="0">
+              <a:prstClr val="black">
+                <a:alpha val="43000"/>
+              </a:prstClr>
+            </a:outerShdw>
+          </a:effectLst>
+        </p:spPr>
+      </p:pic>
+      <p:pic>
+        <p:nvPicPr>
+          <p:cNvPr id="5" name="Pladsholder til indhold 4">
+            <a:extLst>
+              <a:ext uri="{FF2B5EF4-FFF2-40B4-BE49-F238E27FC236}">
+                <a16:creationId xmlns:a16="http://schemas.microsoft.com/office/drawing/2014/main" id="{36D4A359-401B-4318-9204-906F9918A9C6}"/>
+              </a:ext>
+            </a:extLst>
+          </p:cNvPr>
+          <p:cNvPicPr>
+            <a:picLocks noGrp="1" noChangeAspect="1"/>
+          </p:cNvPicPr>
           <p:nvPr>
             <p:ph idx="1"/>
           </p:nvPr>
-        </p:nvSpPr>
-        <p:spPr/>
-        <p:txBody>
-          <a:bodyPr/>
-          <a:lstStyle/>
-          <a:p>
-            <a:endParaRPr lang="da-DK"/>
-          </a:p>
-        </p:txBody>
-      </p:sp>
+        </p:nvPicPr>
+        <p:blipFill rotWithShape="1">
+          <a:blip r:embed="rId10">
+            <a:extLst>
+              <a:ext uri="{28A0092B-C50C-407E-A947-70E740481C1C}">
+                <a14:useLocalDpi xmlns:a14="http://schemas.microsoft.com/office/drawing/2010/main" val="0"/>
+              </a:ext>
+            </a:extLst>
+          </a:blip>
+          <a:srcRect r="12456" b="2"/>
+          <a:stretch/>
+        </p:blipFill>
+        <p:spPr>
+          <a:xfrm>
+            <a:off x="8801105" y="570703"/>
+            <a:ext cx="3319259" cy="5494908"/>
+          </a:xfrm>
+          <a:prstGeom prst="rect">
+            <a:avLst/>
+          </a:prstGeom>
+          <a:effectLst>
+            <a:outerShdw blurRad="50800" dist="38100" dir="5400000" algn="t" rotWithShape="0">
+              <a:prstClr val="black">
+                <a:alpha val="43000"/>
+              </a:prstClr>
+            </a:outerShdw>
+          </a:effectLst>
+        </p:spPr>
+      </p:pic>
     </p:spTree>
     <p:extLst>
       <p:ext uri="{BB962C8B-B14F-4D97-AF65-F5344CB8AC3E}">
-        <p14:creationId xmlns:p14="http://schemas.microsoft.com/office/powerpoint/2010/main" val="1995972202"/>
+        <p14:creationId xmlns:p14="http://schemas.microsoft.com/office/powerpoint/2010/main" val="1708280026"/>
       </p:ext>
     </p:extLst>
   </p:cSld>
@@ -6805,6 +7730,29 @@
 <file path=ppt/slides/slide3.xml><?xml version="1.0" encoding="utf-8"?>
 <p:sld xmlns:a="http://schemas.openxmlformats.org/drawingml/2006/main" xmlns:r="http://schemas.openxmlformats.org/officeDocument/2006/relationships" xmlns:p="http://schemas.openxmlformats.org/presentationml/2006/main">
   <p:cSld>
+    <p:bg>
+      <p:bgPr>
+        <a:blipFill rotWithShape="1">
+          <a:blip r:embed="rId2">
+            <a:duotone>
+              <a:schemeClr val="bg2">
+                <a:shade val="69000"/>
+                <a:hueMod val="91000"/>
+                <a:satMod val="164000"/>
+                <a:lumMod val="74000"/>
+              </a:schemeClr>
+              <a:schemeClr val="bg2">
+                <a:hueMod val="124000"/>
+                <a:satMod val="140000"/>
+                <a:lumMod val="142000"/>
+              </a:schemeClr>
+            </a:duotone>
+          </a:blip>
+          <a:stretch/>
+        </a:blipFill>
+        <a:effectLst/>
+      </p:bgPr>
+    </p:bg>
     <p:spTree>
       <p:nvGrpSpPr>
         <p:cNvPr id="1" name=""/>
@@ -6819,12 +7767,315 @@
           <a:chExt cx="0" cy="0"/>
         </a:xfrm>
       </p:grpSpPr>
+      <p:pic>
+        <p:nvPicPr>
+          <p:cNvPr id="29" name="Picture 28">
+            <a:extLst>
+              <a:ext uri="{FF2B5EF4-FFF2-40B4-BE49-F238E27FC236}">
+                <a16:creationId xmlns:a16="http://schemas.microsoft.com/office/drawing/2014/main" id="{8B6CEEE2-F04A-4495-BAA5-41ADC79BDBF6}"/>
+              </a:ext>
+              <a:ext uri="{C183D7F6-B498-43B3-948B-1728B52AA6E4}">
+                <adec:decorative xmlns:adec="http://schemas.microsoft.com/office/drawing/2017/decorative" val="1"/>
+              </a:ext>
+            </a:extLst>
+          </p:cNvPr>
+          <p:cNvPicPr>
+            <a:picLocks noGrp="1" noRot="1" noChangeAspect="1" noMove="1" noResize="1" noEditPoints="1" noAdjustHandles="1" noChangeArrowheads="1" noChangeShapeType="1" noCrop="1"/>
+          </p:cNvPicPr>
+          <p:nvPr>
+            <p:extLst>
+              <p:ext uri="{386F3935-93C4-4BCD-93E2-E3B085C9AB24}">
+                <p16:designElem xmlns:p16="http://schemas.microsoft.com/office/powerpoint/2015/main" val="1"/>
+              </p:ext>
+            </p:extLst>
+          </p:nvPr>
+        </p:nvPicPr>
+        <p:blipFill rotWithShape="1">
+          <a:blip r:embed="rId3">
+            <a:extLst>
+              <a:ext uri="{28A0092B-C50C-407E-A947-70E740481C1C}">
+                <a14:useLocalDpi xmlns:a14="http://schemas.microsoft.com/office/drawing/2010/main" val="0"/>
+              </a:ext>
+            </a:extLst>
+          </a:blip>
+          <a:srcRect l="3644"/>
+          <a:stretch/>
+        </p:blipFill>
+        <p:spPr>
+          <a:xfrm>
+            <a:off x="0" y="2669685"/>
+            <a:ext cx="4035669" cy="4188315"/>
+          </a:xfrm>
+          <a:prstGeom prst="rect">
+            <a:avLst/>
+          </a:prstGeom>
+        </p:spPr>
+      </p:pic>
+      <p:pic>
+        <p:nvPicPr>
+          <p:cNvPr id="31" name="Picture 30">
+            <a:extLst>
+              <a:ext uri="{FF2B5EF4-FFF2-40B4-BE49-F238E27FC236}">
+                <a16:creationId xmlns:a16="http://schemas.microsoft.com/office/drawing/2014/main" id="{534DD426-4D43-43D2-BEFD-ED65D6CA127A}"/>
+              </a:ext>
+              <a:ext uri="{C183D7F6-B498-43B3-948B-1728B52AA6E4}">
+                <adec:decorative xmlns:adec="http://schemas.microsoft.com/office/drawing/2017/decorative" val="1"/>
+              </a:ext>
+            </a:extLst>
+          </p:cNvPr>
+          <p:cNvPicPr>
+            <a:picLocks noGrp="1" noRot="1" noChangeAspect="1" noMove="1" noResize="1" noEditPoints="1" noAdjustHandles="1" noChangeArrowheads="1" noChangeShapeType="1" noCrop="1"/>
+          </p:cNvPicPr>
+          <p:nvPr>
+            <p:extLst>
+              <p:ext uri="{386F3935-93C4-4BCD-93E2-E3B085C9AB24}">
+                <p16:designElem xmlns:p16="http://schemas.microsoft.com/office/powerpoint/2015/main" val="1"/>
+              </p:ext>
+            </p:extLst>
+          </p:nvPr>
+        </p:nvPicPr>
+        <p:blipFill rotWithShape="1">
+          <a:blip r:embed="rId4">
+            <a:extLst>
+              <a:ext uri="{28A0092B-C50C-407E-A947-70E740481C1C}">
+                <a14:useLocalDpi xmlns:a14="http://schemas.microsoft.com/office/drawing/2010/main" val="0"/>
+              </a:ext>
+            </a:extLst>
+          </a:blip>
+          <a:srcRect l="35640"/>
+          <a:stretch/>
+        </p:blipFill>
+        <p:spPr>
+          <a:xfrm>
+            <a:off x="0" y="2892347"/>
+            <a:ext cx="1522412" cy="2365453"/>
+          </a:xfrm>
+          <a:prstGeom prst="rect">
+            <a:avLst/>
+          </a:prstGeom>
+        </p:spPr>
+      </p:pic>
+      <p:sp>
+        <p:nvSpPr>
+          <p:cNvPr id="33" name="Oval 32">
+            <a:extLst>
+              <a:ext uri="{FF2B5EF4-FFF2-40B4-BE49-F238E27FC236}">
+                <a16:creationId xmlns:a16="http://schemas.microsoft.com/office/drawing/2014/main" id="{DD419DCE-20CD-483A-A34D-DDA94B2B0025}"/>
+              </a:ext>
+              <a:ext uri="{C183D7F6-B498-43B3-948B-1728B52AA6E4}">
+                <adec:decorative xmlns:adec="http://schemas.microsoft.com/office/drawing/2017/decorative" val="1"/>
+              </a:ext>
+            </a:extLst>
+          </p:cNvPr>
+          <p:cNvSpPr>
+            <a:spLocks noGrp="1" noRot="1" noChangeAspect="1" noMove="1" noResize="1" noEditPoints="1" noAdjustHandles="1" noChangeArrowheads="1" noChangeShapeType="1" noTextEdit="1"/>
+          </p:cNvSpPr>
+          <p:nvPr>
+            <p:extLst>
+              <p:ext uri="{386F3935-93C4-4BCD-93E2-E3B085C9AB24}">
+                <p16:designElem xmlns:p16="http://schemas.microsoft.com/office/powerpoint/2015/main" val="1"/>
+              </p:ext>
+            </p:extLst>
+          </p:nvPr>
+        </p:nvSpPr>
+        <p:spPr>
+          <a:xfrm>
+            <a:off x="8609012" y="1676400"/>
+            <a:ext cx="2819400" cy="2819400"/>
+          </a:xfrm>
+          <a:prstGeom prst="ellipse">
+            <a:avLst/>
+          </a:prstGeom>
+          <a:gradFill flip="none" rotWithShape="1">
+            <a:gsLst>
+              <a:gs pos="0">
+                <a:schemeClr val="accent5">
+                  <a:alpha val="7000"/>
+                </a:schemeClr>
+              </a:gs>
+              <a:gs pos="69000">
+                <a:schemeClr val="accent5">
+                  <a:alpha val="0"/>
+                </a:schemeClr>
+              </a:gs>
+              <a:gs pos="36000">
+                <a:schemeClr val="accent5">
+                  <a:alpha val="6000"/>
+                </a:schemeClr>
+              </a:gs>
+            </a:gsLst>
+            <a:path path="circle">
+              <a:fillToRect l="50000" t="50000" r="50000" b="50000"/>
+            </a:path>
+            <a:tileRect/>
+          </a:gradFill>
+          <a:ln>
+            <a:noFill/>
+          </a:ln>
+          <a:effectLst/>
+        </p:spPr>
+        <p:style>
+          <a:lnRef idx="1">
+            <a:schemeClr val="accent1"/>
+          </a:lnRef>
+          <a:fillRef idx="3">
+            <a:schemeClr val="accent1"/>
+          </a:fillRef>
+          <a:effectRef idx="2">
+            <a:schemeClr val="accent1"/>
+          </a:effectRef>
+          <a:fontRef idx="minor">
+            <a:schemeClr val="lt1"/>
+          </a:fontRef>
+        </p:style>
+      </p:sp>
+      <p:pic>
+        <p:nvPicPr>
+          <p:cNvPr id="35" name="Picture 34">
+            <a:extLst>
+              <a:ext uri="{FF2B5EF4-FFF2-40B4-BE49-F238E27FC236}">
+                <a16:creationId xmlns:a16="http://schemas.microsoft.com/office/drawing/2014/main" id="{75BBAA3E-B261-431F-9672-A48853A5138E}"/>
+              </a:ext>
+              <a:ext uri="{C183D7F6-B498-43B3-948B-1728B52AA6E4}">
+                <adec:decorative xmlns:adec="http://schemas.microsoft.com/office/drawing/2017/decorative" val="1"/>
+              </a:ext>
+            </a:extLst>
+          </p:cNvPr>
+          <p:cNvPicPr>
+            <a:picLocks noGrp="1" noRot="1" noChangeAspect="1" noMove="1" noResize="1" noEditPoints="1" noAdjustHandles="1" noChangeArrowheads="1" noChangeShapeType="1" noCrop="1"/>
+          </p:cNvPicPr>
+          <p:nvPr>
+            <p:extLst>
+              <p:ext uri="{386F3935-93C4-4BCD-93E2-E3B085C9AB24}">
+                <p16:designElem xmlns:p16="http://schemas.microsoft.com/office/powerpoint/2015/main" val="1"/>
+              </p:ext>
+            </p:extLst>
+          </p:nvPr>
+        </p:nvPicPr>
+        <p:blipFill rotWithShape="1">
+          <a:blip r:embed="rId5">
+            <a:extLst>
+              <a:ext uri="{28A0092B-C50C-407E-A947-70E740481C1C}">
+                <a14:useLocalDpi xmlns:a14="http://schemas.microsoft.com/office/drawing/2010/main" val="0"/>
+              </a:ext>
+            </a:extLst>
+          </a:blip>
+          <a:srcRect t="28813"/>
+          <a:stretch/>
+        </p:blipFill>
+        <p:spPr>
+          <a:xfrm>
+            <a:off x="7999412" y="0"/>
+            <a:ext cx="1603387" cy="1141407"/>
+          </a:xfrm>
+          <a:prstGeom prst="rect">
+            <a:avLst/>
+          </a:prstGeom>
+        </p:spPr>
+      </p:pic>
+      <p:pic>
+        <p:nvPicPr>
+          <p:cNvPr id="37" name="Picture 36">
+            <a:extLst>
+              <a:ext uri="{FF2B5EF4-FFF2-40B4-BE49-F238E27FC236}">
+                <a16:creationId xmlns:a16="http://schemas.microsoft.com/office/drawing/2014/main" id="{3A27BFFC-8090-4322-BE46-86AED6BCFFDC}"/>
+              </a:ext>
+              <a:ext uri="{C183D7F6-B498-43B3-948B-1728B52AA6E4}">
+                <adec:decorative xmlns:adec="http://schemas.microsoft.com/office/drawing/2017/decorative" val="1"/>
+              </a:ext>
+            </a:extLst>
+          </p:cNvPr>
+          <p:cNvPicPr>
+            <a:picLocks noGrp="1" noRot="1" noChangeAspect="1" noMove="1" noResize="1" noEditPoints="1" noAdjustHandles="1" noChangeArrowheads="1" noChangeShapeType="1" noCrop="1"/>
+          </p:cNvPicPr>
+          <p:nvPr>
+            <p:extLst>
+              <p:ext uri="{386F3935-93C4-4BCD-93E2-E3B085C9AB24}">
+                <p16:designElem xmlns:p16="http://schemas.microsoft.com/office/powerpoint/2015/main" val="1"/>
+              </p:ext>
+            </p:extLst>
+          </p:nvPr>
+        </p:nvPicPr>
+        <p:blipFill rotWithShape="1">
+          <a:blip r:embed="rId6">
+            <a:extLst>
+              <a:ext uri="{28A0092B-C50C-407E-A947-70E740481C1C}">
+                <a14:useLocalDpi xmlns:a14="http://schemas.microsoft.com/office/drawing/2010/main" val="0"/>
+              </a:ext>
+            </a:extLst>
+          </a:blip>
+          <a:srcRect b="23320"/>
+          <a:stretch/>
+        </p:blipFill>
+        <p:spPr>
+          <a:xfrm>
+            <a:off x="8609012" y="6096000"/>
+            <a:ext cx="993734" cy="762000"/>
+          </a:xfrm>
+          <a:prstGeom prst="rect">
+            <a:avLst/>
+          </a:prstGeom>
+        </p:spPr>
+      </p:pic>
+      <p:sp>
+        <p:nvSpPr>
+          <p:cNvPr id="39" name="Rectangle 38">
+            <a:extLst>
+              <a:ext uri="{FF2B5EF4-FFF2-40B4-BE49-F238E27FC236}">
+                <a16:creationId xmlns:a16="http://schemas.microsoft.com/office/drawing/2014/main" id="{F0E43693-1F05-4B93-A429-6944E009925E}"/>
+              </a:ext>
+              <a:ext uri="{C183D7F6-B498-43B3-948B-1728B52AA6E4}">
+                <adec:decorative xmlns:adec="http://schemas.microsoft.com/office/drawing/2017/decorative" val="1"/>
+              </a:ext>
+            </a:extLst>
+          </p:cNvPr>
+          <p:cNvSpPr>
+            <a:spLocks noGrp="1" noRot="1" noChangeAspect="1" noMove="1" noResize="1" noEditPoints="1" noAdjustHandles="1" noChangeArrowheads="1" noChangeShapeType="1" noTextEdit="1"/>
+          </p:cNvSpPr>
+          <p:nvPr>
+            <p:extLst>
+              <p:ext uri="{386F3935-93C4-4BCD-93E2-E3B085C9AB24}">
+                <p16:designElem xmlns:p16="http://schemas.microsoft.com/office/powerpoint/2015/main" val="1"/>
+              </p:ext>
+            </p:extLst>
+          </p:nvPr>
+        </p:nvSpPr>
+        <p:spPr>
+          <a:xfrm>
+            <a:off x="10437812" y="0"/>
+            <a:ext cx="685800" cy="1143000"/>
+          </a:xfrm>
+          <a:prstGeom prst="rect">
+            <a:avLst/>
+          </a:prstGeom>
+          <a:solidFill>
+            <a:schemeClr val="accent1"/>
+          </a:solidFill>
+          <a:ln>
+            <a:noFill/>
+          </a:ln>
+        </p:spPr>
+        <p:style>
+          <a:lnRef idx="1">
+            <a:schemeClr val="accent1"/>
+          </a:lnRef>
+          <a:fillRef idx="3">
+            <a:schemeClr val="accent1"/>
+          </a:fillRef>
+          <a:effectRef idx="2">
+            <a:schemeClr val="accent1"/>
+          </a:effectRef>
+          <a:fontRef idx="minor">
+            <a:schemeClr val="lt1"/>
+          </a:fontRef>
+        </p:style>
+      </p:sp>
       <p:sp>
         <p:nvSpPr>
           <p:cNvPr id="2" name="Titel 1">
             <a:extLst>
               <a:ext uri="{FF2B5EF4-FFF2-40B4-BE49-F238E27FC236}">
-                <a16:creationId xmlns:a16="http://schemas.microsoft.com/office/drawing/2014/main" id="{A1AA1631-51A5-45FD-A74B-52EDCA3D1700}"/>
+                <a16:creationId xmlns:a16="http://schemas.microsoft.com/office/drawing/2014/main" id="{DF6A03A1-90E1-44F9-94A6-9FB75598A111}"/>
               </a:ext>
             </a:extLst>
           </p:cNvPr>
@@ -6835,95 +8086,199 @@
             <p:ph type="title"/>
           </p:nvPr>
         </p:nvSpPr>
-        <p:spPr/>
-        <p:txBody>
-          <a:bodyPr/>
-          <a:lstStyle/>
-          <a:p>
-            <a:r>
-              <a:rPr lang="da-DK" dirty="0"/>
-              <a:t>Demo af web app</a:t>
-            </a:r>
-          </a:p>
-        </p:txBody>
-      </p:sp>
-      <p:sp>
-        <p:nvSpPr>
-          <p:cNvPr id="3" name="Pladsholder til indhold 2">
-            <a:extLst>
-              <a:ext uri="{FF2B5EF4-FFF2-40B4-BE49-F238E27FC236}">
-                <a16:creationId xmlns:a16="http://schemas.microsoft.com/office/drawing/2014/main" id="{4001763B-B5BC-4D4C-9F4E-97B52867D1CC}"/>
-              </a:ext>
-            </a:extLst>
-          </p:cNvPr>
-          <p:cNvSpPr>
-            <a:spLocks noGrp="1"/>
-          </p:cNvSpPr>
-          <p:nvPr>
-            <p:ph idx="1"/>
-          </p:nvPr>
-        </p:nvSpPr>
-        <p:spPr/>
-        <p:txBody>
-          <a:bodyPr>
+        <p:spPr>
+          <a:xfrm>
+            <a:off x="635458" y="4542502"/>
+            <a:ext cx="9181185" cy="1189985"/>
+          </a:xfrm>
+        </p:spPr>
+        <p:txBody>
+          <a:bodyPr vert="horz" lIns="91440" tIns="45720" rIns="91440" bIns="45720" rtlCol="0" anchor="b">
             <a:normAutofit/>
           </a:bodyPr>
           <a:lstStyle/>
           <a:p>
             <a:r>
-              <a:rPr lang="da-DK" dirty="0"/>
-              <a:t>Login side/opret bruger</a:t>
-            </a:r>
-          </a:p>
-          <a:p>
-            <a:r>
-              <a:rPr lang="da-DK" dirty="0"/>
-              <a:t>Brugerprofil</a:t>
-            </a:r>
-          </a:p>
-          <a:p>
-            <a:r>
-              <a:rPr lang="da-DK" dirty="0"/>
-              <a:t>Søgefunktion</a:t>
-            </a:r>
-          </a:p>
-          <a:p>
-            <a:r>
-              <a:rPr lang="da-DK" dirty="0"/>
-              <a:t>Favorit</a:t>
-            </a:r>
-          </a:p>
-          <a:p>
-            <a:r>
-              <a:rPr lang="da-DK" dirty="0"/>
-              <a:t>Message system</a:t>
-            </a:r>
-          </a:p>
-          <a:p>
-            <a:r>
-              <a:rPr lang="da-DK" dirty="0"/>
-              <a:t>Top5 side</a:t>
-            </a:r>
-          </a:p>
-          <a:p>
-            <a:r>
-              <a:rPr lang="da-DK" dirty="0" err="1"/>
-              <a:t>Admin</a:t>
-            </a:r>
-            <a:r>
-              <a:rPr lang="da-DK" dirty="0"/>
-              <a:t> page</a:t>
-            </a:r>
-          </a:p>
-          <a:p>
-            <a:endParaRPr lang="da-DK" dirty="0"/>
-          </a:p>
-        </p:txBody>
-      </p:sp>
+              <a:rPr lang="en-US" sz="6500"/>
+              <a:t>Prototype</a:t>
+            </a:r>
+          </a:p>
+        </p:txBody>
+      </p:sp>
+      <p:pic>
+        <p:nvPicPr>
+          <p:cNvPr id="5" name="Pladsholder til indhold 4" descr="Et billede, der indeholder tekst&#10;&#10;Automatisk genereret beskrivelse">
+            <a:extLst>
+              <a:ext uri="{FF2B5EF4-FFF2-40B4-BE49-F238E27FC236}">
+                <a16:creationId xmlns:a16="http://schemas.microsoft.com/office/drawing/2014/main" id="{8FAF0FCA-6A46-44DC-A797-105BA60E3D84}"/>
+              </a:ext>
+            </a:extLst>
+          </p:cNvPr>
+          <p:cNvPicPr>
+            <a:picLocks noGrp="1" noChangeAspect="1"/>
+          </p:cNvPicPr>
+          <p:nvPr>
+            <p:ph idx="1"/>
+          </p:nvPr>
+        </p:nvPicPr>
+        <p:blipFill rotWithShape="1">
+          <a:blip r:embed="rId7">
+            <a:extLst>
+              <a:ext uri="{28A0092B-C50C-407E-A947-70E740481C1C}">
+                <a14:useLocalDpi xmlns:a14="http://schemas.microsoft.com/office/drawing/2010/main" val="0"/>
+              </a:ext>
+            </a:extLst>
+          </a:blip>
+          <a:srcRect r="4498" b="2"/>
+          <a:stretch/>
+        </p:blipFill>
+        <p:spPr>
+          <a:xfrm>
+            <a:off x="408125" y="547837"/>
+            <a:ext cx="2587624" cy="4283714"/>
+          </a:xfrm>
+          <a:prstGeom prst="rect">
+            <a:avLst/>
+          </a:prstGeom>
+          <a:effectLst>
+            <a:outerShdw blurRad="50800" dist="38100" dir="5400000" algn="t" rotWithShape="0">
+              <a:prstClr val="black">
+                <a:alpha val="43000"/>
+              </a:prstClr>
+            </a:outerShdw>
+          </a:effectLst>
+        </p:spPr>
+      </p:pic>
+      <p:pic>
+        <p:nvPicPr>
+          <p:cNvPr id="7" name="Billede 6" descr="Et billede, der indeholder tekst, whiteboard&#10;&#10;Automatisk genereret beskrivelse">
+            <a:extLst>
+              <a:ext uri="{FF2B5EF4-FFF2-40B4-BE49-F238E27FC236}">
+                <a16:creationId xmlns:a16="http://schemas.microsoft.com/office/drawing/2014/main" id="{55B72F10-601E-4BD3-B83D-229494CB6092}"/>
+              </a:ext>
+            </a:extLst>
+          </p:cNvPr>
+          <p:cNvPicPr>
+            <a:picLocks noChangeAspect="1"/>
+          </p:cNvPicPr>
+          <p:nvPr/>
+        </p:nvPicPr>
+        <p:blipFill rotWithShape="1">
+          <a:blip r:embed="rId8">
+            <a:extLst>
+              <a:ext uri="{28A0092B-C50C-407E-A947-70E740481C1C}">
+                <a14:useLocalDpi xmlns:a14="http://schemas.microsoft.com/office/drawing/2010/main" val="0"/>
+              </a:ext>
+            </a:extLst>
+          </a:blip>
+          <a:srcRect r="12456" b="2"/>
+          <a:stretch/>
+        </p:blipFill>
+        <p:spPr>
+          <a:xfrm>
+            <a:off x="3163078" y="566498"/>
+            <a:ext cx="2644837" cy="4378428"/>
+          </a:xfrm>
+          <a:prstGeom prst="rect">
+            <a:avLst/>
+          </a:prstGeom>
+          <a:effectLst>
+            <a:outerShdw blurRad="50800" dist="38100" dir="5400000" algn="t" rotWithShape="0">
+              <a:prstClr val="black">
+                <a:alpha val="43000"/>
+              </a:prstClr>
+            </a:outerShdw>
+          </a:effectLst>
+        </p:spPr>
+      </p:pic>
+      <p:pic>
+        <p:nvPicPr>
+          <p:cNvPr id="9" name="Billede 8" descr="Et billede, der indeholder tekst&#10;&#10;Automatisk genereret beskrivelse">
+            <a:extLst>
+              <a:ext uri="{FF2B5EF4-FFF2-40B4-BE49-F238E27FC236}">
+                <a16:creationId xmlns:a16="http://schemas.microsoft.com/office/drawing/2014/main" id="{4B9FD3B1-BC84-4BB2-83AE-5918A72EE858}"/>
+              </a:ext>
+            </a:extLst>
+          </p:cNvPr>
+          <p:cNvPicPr>
+            <a:picLocks noChangeAspect="1"/>
+          </p:cNvPicPr>
+          <p:nvPr/>
+        </p:nvPicPr>
+        <p:blipFill rotWithShape="1">
+          <a:blip r:embed="rId9">
+            <a:extLst>
+              <a:ext uri="{28A0092B-C50C-407E-A947-70E740481C1C}">
+                <a14:useLocalDpi xmlns:a14="http://schemas.microsoft.com/office/drawing/2010/main" val="0"/>
+              </a:ext>
+            </a:extLst>
+          </a:blip>
+          <a:srcRect l="2813" r="16915" b="2"/>
+          <a:stretch/>
+        </p:blipFill>
+        <p:spPr>
+          <a:xfrm>
+            <a:off x="5981705" y="527191"/>
+            <a:ext cx="2819400" cy="4667410"/>
+          </a:xfrm>
+          <a:prstGeom prst="rect">
+            <a:avLst/>
+          </a:prstGeom>
+          <a:effectLst>
+            <a:outerShdw blurRad="50800" dist="38100" dir="5400000" algn="t" rotWithShape="0">
+              <a:prstClr val="black">
+                <a:alpha val="43000"/>
+              </a:prstClr>
+            </a:outerShdw>
+          </a:effectLst>
+        </p:spPr>
+      </p:pic>
+      <p:pic>
+        <p:nvPicPr>
+          <p:cNvPr id="11" name="Billede 10" descr="Et billede, der indeholder tekst&#10;&#10;Automatisk genereret beskrivelse">
+            <a:extLst>
+              <a:ext uri="{FF2B5EF4-FFF2-40B4-BE49-F238E27FC236}">
+                <a16:creationId xmlns:a16="http://schemas.microsoft.com/office/drawing/2014/main" id="{EF7DC162-CF63-4313-BA0E-8072BCBEC0FA}"/>
+              </a:ext>
+            </a:extLst>
+          </p:cNvPr>
+          <p:cNvPicPr>
+            <a:picLocks noChangeAspect="1"/>
+          </p:cNvPicPr>
+          <p:nvPr/>
+        </p:nvPicPr>
+        <p:blipFill rotWithShape="1">
+          <a:blip r:embed="rId10">
+            <a:extLst>
+              <a:ext uri="{28A0092B-C50C-407E-A947-70E740481C1C}">
+                <a14:useLocalDpi xmlns:a14="http://schemas.microsoft.com/office/drawing/2010/main" val="0"/>
+              </a:ext>
+            </a:extLst>
+          </a:blip>
+          <a:srcRect l="3260" r="10138" b="2"/>
+          <a:stretch/>
+        </p:blipFill>
+        <p:spPr>
+          <a:xfrm>
+            <a:off x="8964475" y="527191"/>
+            <a:ext cx="2819400" cy="4667410"/>
+          </a:xfrm>
+          <a:prstGeom prst="rect">
+            <a:avLst/>
+          </a:prstGeom>
+          <a:effectLst>
+            <a:outerShdw blurRad="50800" dist="38100" dir="5400000" algn="t" rotWithShape="0">
+              <a:prstClr val="black">
+                <a:alpha val="43000"/>
+              </a:prstClr>
+            </a:outerShdw>
+          </a:effectLst>
+        </p:spPr>
+      </p:pic>
     </p:spTree>
     <p:extLst>
       <p:ext uri="{BB962C8B-B14F-4D97-AF65-F5344CB8AC3E}">
-        <p14:creationId xmlns:p14="http://schemas.microsoft.com/office/powerpoint/2010/main" val="2743938207"/>
+        <p14:creationId xmlns:p14="http://schemas.microsoft.com/office/powerpoint/2010/main" val="1995972202"/>
       </p:ext>
     </p:extLst>
   </p:cSld>
@@ -6955,7 +8310,7 @@
           <p:cNvPr id="2" name="Titel 1">
             <a:extLst>
               <a:ext uri="{FF2B5EF4-FFF2-40B4-BE49-F238E27FC236}">
-                <a16:creationId xmlns:a16="http://schemas.microsoft.com/office/drawing/2014/main" id="{9152374F-E5C3-413C-A020-368BD74F005B}"/>
+                <a16:creationId xmlns:a16="http://schemas.microsoft.com/office/drawing/2014/main" id="{A1AA1631-51A5-45FD-A74B-52EDCA3D1700}"/>
               </a:ext>
             </a:extLst>
           </p:cNvPr>
@@ -6972,12 +8327,8 @@
           <a:lstStyle/>
           <a:p>
             <a:r>
-              <a:rPr lang="da-DK" dirty="0" err="1"/>
-              <a:t>Usability</a:t>
-            </a:r>
-            <a:r>
               <a:rPr lang="da-DK" dirty="0"/>
-              <a:t> test</a:t>
+              <a:t>Demo af web app</a:t>
             </a:r>
           </a:p>
         </p:txBody>
@@ -6987,7 +8338,7 @@
           <p:cNvPr id="3" name="Pladsholder til indhold 2">
             <a:extLst>
               <a:ext uri="{FF2B5EF4-FFF2-40B4-BE49-F238E27FC236}">
-                <a16:creationId xmlns:a16="http://schemas.microsoft.com/office/drawing/2014/main" id="{3EB921C5-FAF1-4BB2-BF39-CA36CA770F9F}"/>
+                <a16:creationId xmlns:a16="http://schemas.microsoft.com/office/drawing/2014/main" id="{4001763B-B5BC-4D4C-9F4E-97B52867D1CC}"/>
               </a:ext>
             </a:extLst>
           </p:cNvPr>
@@ -7006,80 +8357,51 @@
           <a:lstStyle/>
           <a:p>
             <a:r>
-              <a:rPr lang="da-DK" i="1" dirty="0"/>
-              <a:t>Antal deltagere i testen n=3</a:t>
-            </a:r>
-            <a:br>
-              <a:rPr lang="da-DK" i="1" dirty="0"/>
-            </a:br>
-            <a:endParaRPr lang="da-DK" i="1" dirty="0"/>
-          </a:p>
-          <a:p>
-            <a:r>
-              <a:rPr lang="da-DK" i="1" dirty="0"/>
-              <a:t>Opgave: Opret bruger</a:t>
-            </a:r>
-          </a:p>
-          <a:p>
-            <a:endParaRPr lang="da-DK" dirty="0"/>
-          </a:p>
-          <a:p>
-            <a:r>
-              <a:rPr lang="da-DK" i="1" dirty="0"/>
-              <a:t>Opgave: Edit din profil – tags og om mig</a:t>
-            </a:r>
-          </a:p>
-          <a:p>
-            <a:pPr marL="0" indent="0">
-              <a:buNone/>
-            </a:pPr>
-            <a:r>
               <a:rPr lang="da-DK" dirty="0"/>
-              <a:t>- Om mig </a:t>
-            </a:r>
+              <a:t>Login side/opret bruger</a:t>
+            </a:r>
+          </a:p>
+          <a:p>
+            <a:r>
+              <a:rPr lang="da-DK" dirty="0"/>
+              <a:t>Brugerprofil</a:t>
+            </a:r>
+          </a:p>
+          <a:p>
+            <a:r>
+              <a:rPr lang="da-DK" dirty="0"/>
+              <a:t>Søgefunktion</a:t>
+            </a:r>
+          </a:p>
+          <a:p>
+            <a:r>
+              <a:rPr lang="da-DK" dirty="0"/>
+              <a:t>Favorit</a:t>
+            </a:r>
+          </a:p>
+          <a:p>
+            <a:r>
+              <a:rPr lang="da-DK" dirty="0"/>
+              <a:t>Message system</a:t>
+            </a:r>
+          </a:p>
+          <a:p>
+            <a:r>
+              <a:rPr lang="da-DK" dirty="0"/>
+              <a:t>Top5 side</a:t>
+            </a:r>
+          </a:p>
+          <a:p>
             <a:r>
               <a:rPr lang="da-DK" dirty="0" err="1"/>
-              <a:t>edit</a:t>
+              <a:t>Admin</a:t>
             </a:r>
             <a:r>
               <a:rPr lang="da-DK" dirty="0"/>
-              <a:t> er for skjult</a:t>
-            </a:r>
-          </a:p>
-          <a:p>
-            <a:pPr marL="0" indent="0">
-              <a:buNone/>
-            </a:pPr>
-            <a:endParaRPr lang="da-DK" dirty="0"/>
-          </a:p>
-          <a:p>
-            <a:pPr marL="0" indent="0">
-              <a:buNone/>
-            </a:pPr>
-            <a:r>
-              <a:rPr lang="da-DK" i="1" dirty="0"/>
-              <a:t>Opgave: Send en besked til en anden bruger</a:t>
-            </a:r>
-          </a:p>
-          <a:p>
-            <a:pPr marL="0" indent="0">
-              <a:buNone/>
-            </a:pPr>
-            <a:r>
-              <a:rPr lang="da-DK" dirty="0"/>
-              <a:t>- Kom til at sende besked til sig selv</a:t>
-            </a:r>
-          </a:p>
-          <a:p>
-            <a:pPr marL="0" indent="0">
-              <a:buNone/>
-            </a:pPr>
-            <a:endParaRPr lang="da-DK" dirty="0"/>
-          </a:p>
-          <a:p>
-            <a:pPr marL="0" indent="0">
-              <a:buNone/>
-            </a:pPr>
+              <a:t> page</a:t>
+            </a:r>
+          </a:p>
+          <a:p>
             <a:endParaRPr lang="da-DK" dirty="0"/>
           </a:p>
         </p:txBody>
@@ -7087,7 +8409,7 @@
     </p:spTree>
     <p:extLst>
       <p:ext uri="{BB962C8B-B14F-4D97-AF65-F5344CB8AC3E}">
-        <p14:creationId xmlns:p14="http://schemas.microsoft.com/office/powerpoint/2010/main" val="1638524070"/>
+        <p14:creationId xmlns:p14="http://schemas.microsoft.com/office/powerpoint/2010/main" val="2743938207"/>
       </p:ext>
     </p:extLst>
   </p:cSld>
@@ -7119,7 +8441,7 @@
           <p:cNvPr id="2" name="Titel 1">
             <a:extLst>
               <a:ext uri="{FF2B5EF4-FFF2-40B4-BE49-F238E27FC236}">
-                <a16:creationId xmlns:a16="http://schemas.microsoft.com/office/drawing/2014/main" id="{BE5299A9-D818-4846-9F75-7B345224C32D}"/>
+                <a16:creationId xmlns:a16="http://schemas.microsoft.com/office/drawing/2014/main" id="{9152374F-E5C3-413C-A020-368BD74F005B}"/>
               </a:ext>
             </a:extLst>
           </p:cNvPr>
@@ -7128,6 +8450,38 @@
           </p:cNvSpPr>
           <p:nvPr>
             <p:ph type="title"/>
+          </p:nvPr>
+        </p:nvSpPr>
+        <p:spPr/>
+        <p:txBody>
+          <a:bodyPr/>
+          <a:lstStyle/>
+          <a:p>
+            <a:r>
+              <a:rPr lang="da-DK" dirty="0" err="1"/>
+              <a:t>Usability</a:t>
+            </a:r>
+            <a:r>
+              <a:rPr lang="da-DK" dirty="0"/>
+              <a:t> test</a:t>
+            </a:r>
+          </a:p>
+        </p:txBody>
+      </p:sp>
+      <p:sp>
+        <p:nvSpPr>
+          <p:cNvPr id="3" name="Pladsholder til indhold 2">
+            <a:extLst>
+              <a:ext uri="{FF2B5EF4-FFF2-40B4-BE49-F238E27FC236}">
+                <a16:creationId xmlns:a16="http://schemas.microsoft.com/office/drawing/2014/main" id="{3EB921C5-FAF1-4BB2-BF39-CA36CA770F9F}"/>
+              </a:ext>
+            </a:extLst>
+          </p:cNvPr>
+          <p:cNvSpPr>
+            <a:spLocks noGrp="1"/>
+          </p:cNvSpPr>
+          <p:nvPr>
+            <p:ph idx="1"/>
           </p:nvPr>
         </p:nvSpPr>
         <p:spPr/>
@@ -7138,137 +8492,94 @@
           <a:lstStyle/>
           <a:p>
             <a:r>
+              <a:rPr lang="da-DK" i="1" dirty="0"/>
+              <a:t>Antal deltagere i testen n=3</a:t>
+            </a:r>
+            <a:br>
+              <a:rPr lang="da-DK" i="1" dirty="0"/>
+            </a:br>
+            <a:endParaRPr lang="da-DK" i="1" dirty="0"/>
+          </a:p>
+          <a:p>
+            <a:r>
+              <a:rPr lang="da-DK" i="1" dirty="0"/>
+              <a:t>Opgave: Opret bruger</a:t>
+            </a:r>
+          </a:p>
+          <a:p>
+            <a:pPr marL="0" indent="0">
+              <a:buNone/>
+            </a:pPr>
+            <a:r>
+              <a:rPr lang="da-DK" i="1" dirty="0"/>
+              <a:t>	 Ingen problemer</a:t>
+            </a:r>
+          </a:p>
+          <a:p>
+            <a:endParaRPr lang="da-DK" dirty="0"/>
+          </a:p>
+          <a:p>
+            <a:r>
+              <a:rPr lang="da-DK" i="1" dirty="0"/>
+              <a:t>Opgave: Edit din profil – tags og om mig</a:t>
+            </a:r>
+          </a:p>
+          <a:p>
+            <a:pPr marL="0" indent="0">
+              <a:buNone/>
+            </a:pPr>
+            <a:r>
               <a:rPr lang="da-DK" dirty="0"/>
-              <a:t>Golden </a:t>
+              <a:t>	Om mig </a:t>
             </a:r>
             <a:r>
               <a:rPr lang="da-DK" dirty="0" err="1"/>
-              <a:t>rules</a:t>
+              <a:t>edit</a:t>
             </a:r>
             <a:r>
               <a:rPr lang="da-DK" dirty="0"/>
-              <a:t> </a:t>
-            </a:r>
-            <a:r>
-              <a:rPr lang="da-DK" dirty="0" err="1"/>
-              <a:t>pressman</a:t>
-            </a:r>
+              <a:t> er for skjult</a:t>
+            </a:r>
+          </a:p>
+          <a:p>
+            <a:pPr marL="0" indent="0">
+              <a:buNone/>
+            </a:pPr>
+            <a:endParaRPr lang="da-DK" dirty="0"/>
+          </a:p>
+          <a:p>
+            <a:r>
+              <a:rPr lang="da-DK" i="1" dirty="0"/>
+              <a:t>Opgave: Send en besked til en anden bruger</a:t>
+            </a:r>
+          </a:p>
+          <a:p>
+            <a:pPr marL="0" indent="0">
+              <a:buNone/>
+            </a:pPr>
             <a:r>
               <a:rPr lang="da-DK" dirty="0"/>
-              <a:t> og Gestalt </a:t>
-            </a:r>
-            <a:r>
-              <a:rPr lang="da-DK" dirty="0" err="1"/>
-              <a:t>principles</a:t>
-            </a:r>
+              <a:t>	Kom til at sende besked til sig selv</a:t>
+            </a:r>
+          </a:p>
+          <a:p>
+            <a:pPr marL="0" indent="0">
+              <a:buNone/>
+            </a:pPr>
             <a:endParaRPr lang="da-DK" dirty="0"/>
           </a:p>
-        </p:txBody>
-      </p:sp>
-      <p:sp>
-        <p:nvSpPr>
-          <p:cNvPr id="3" name="Pladsholder til indhold 2">
-            <a:extLst>
-              <a:ext uri="{FF2B5EF4-FFF2-40B4-BE49-F238E27FC236}">
-                <a16:creationId xmlns:a16="http://schemas.microsoft.com/office/drawing/2014/main" id="{7FB9FF51-F49E-4A58-9FD3-7E8B92E4D6B6}"/>
-              </a:ext>
-            </a:extLst>
-          </p:cNvPr>
-          <p:cNvSpPr>
-            <a:spLocks noGrp="1"/>
-          </p:cNvSpPr>
-          <p:nvPr>
-            <p:ph idx="1"/>
-          </p:nvPr>
-        </p:nvSpPr>
-        <p:spPr/>
-        <p:txBody>
-          <a:bodyPr/>
-          <a:lstStyle/>
-          <a:p>
-            <a:r>
-              <a:rPr lang="da-DK" dirty="0"/>
-              <a:t>Make interface </a:t>
-            </a:r>
-            <a:r>
-              <a:rPr lang="da-DK" dirty="0" err="1"/>
-              <a:t>consistent</a:t>
-            </a:r>
+          <a:p>
+            <a:pPr marL="0" indent="0">
+              <a:buNone/>
+            </a:pPr>
             <a:endParaRPr lang="da-DK" dirty="0"/>
-          </a:p>
-          <a:p>
-            <a:r>
-              <a:rPr lang="da-DK" dirty="0"/>
-              <a:t>Place user in </a:t>
-            </a:r>
-            <a:r>
-              <a:rPr lang="da-DK" dirty="0" err="1"/>
-              <a:t>control</a:t>
-            </a:r>
-            <a:endParaRPr lang="da-DK" dirty="0"/>
-          </a:p>
-          <a:p>
-            <a:r>
-              <a:rPr lang="da-DK" dirty="0"/>
-              <a:t>-</a:t>
-            </a:r>
-          </a:p>
-          <a:p>
-            <a:r>
-              <a:rPr lang="da-DK" dirty="0"/>
-              <a:t>Gestalt: </a:t>
-            </a:r>
-          </a:p>
-          <a:p>
-            <a:r>
-              <a:rPr lang="da-DK" dirty="0"/>
-              <a:t>Law of </a:t>
-            </a:r>
-            <a:r>
-              <a:rPr lang="da-DK" dirty="0" err="1"/>
-              <a:t>proximity</a:t>
-            </a:r>
-            <a:r>
-              <a:rPr lang="da-DK" dirty="0"/>
-              <a:t>: Tags er tæt sammen, så brugeren ved de har noget med hinanden at gøre.</a:t>
-            </a:r>
-          </a:p>
-          <a:p>
-            <a:r>
-              <a:rPr lang="da-DK" dirty="0"/>
-              <a:t>Law of </a:t>
-            </a:r>
-            <a:r>
-              <a:rPr lang="da-DK" dirty="0" err="1"/>
-              <a:t>closure</a:t>
-            </a:r>
-            <a:r>
-              <a:rPr lang="da-DK" dirty="0"/>
-              <a:t>: Søgning, </a:t>
-            </a:r>
-            <a:r>
-              <a:rPr lang="da-DK" dirty="0" err="1"/>
-              <a:t>favorites</a:t>
-            </a:r>
-            <a:r>
-              <a:rPr lang="da-DK" dirty="0"/>
-              <a:t>, top5 er </a:t>
-            </a:r>
-            <a:r>
-              <a:rPr lang="da-DK" dirty="0" err="1"/>
-              <a:t>grouped</a:t>
-            </a:r>
-            <a:r>
-              <a:rPr lang="da-DK" dirty="0"/>
-              <a:t> i aflukkede kasser</a:t>
-            </a:r>
           </a:p>
         </p:txBody>
       </p:sp>
     </p:spTree>
     <p:extLst>
       <p:ext uri="{BB962C8B-B14F-4D97-AF65-F5344CB8AC3E}">
-        <p14:creationId xmlns:p14="http://schemas.microsoft.com/office/powerpoint/2010/main" val="2721377203"/>
+        <p14:creationId xmlns:p14="http://schemas.microsoft.com/office/powerpoint/2010/main" val="1638524070"/>
       </p:ext>
     </p:extLst>
   </p:cSld>
@@ -7300,7 +8611,7 @@
           <p:cNvPr id="2" name="Titel 1">
             <a:extLst>
               <a:ext uri="{FF2B5EF4-FFF2-40B4-BE49-F238E27FC236}">
-                <a16:creationId xmlns:a16="http://schemas.microsoft.com/office/drawing/2014/main" id="{CC441924-03BB-49EE-9B81-3EA6259F9B7A}"/>
+                <a16:creationId xmlns:a16="http://schemas.microsoft.com/office/drawing/2014/main" id="{BE5299A9-D818-4846-9F75-7B345224C32D}"/>
               </a:ext>
             </a:extLst>
           </p:cNvPr>
@@ -7313,17 +8624,36 @@
         </p:nvSpPr>
         <p:spPr/>
         <p:txBody>
-          <a:bodyPr/>
+          <a:bodyPr>
+            <a:normAutofit/>
+          </a:bodyPr>
           <a:lstStyle/>
           <a:p>
             <a:r>
+              <a:rPr lang="da-DK" dirty="0"/>
+              <a:t>Golden </a:t>
+            </a:r>
+            <a:r>
               <a:rPr lang="da-DK" dirty="0" err="1"/>
-              <a:t>Use</a:t>
+              <a:t>rules</a:t>
             </a:r>
             <a:r>
               <a:rPr lang="da-DK" dirty="0"/>
-              <a:t> case diagram</a:t>
-            </a:r>
+              <a:t> </a:t>
+            </a:r>
+            <a:r>
+              <a:rPr lang="da-DK" dirty="0" err="1"/>
+              <a:t>pressman</a:t>
+            </a:r>
+            <a:r>
+              <a:rPr lang="da-DK" dirty="0"/>
+              <a:t> og Gestalt </a:t>
+            </a:r>
+            <a:r>
+              <a:rPr lang="da-DK" dirty="0" err="1"/>
+              <a:t>principles</a:t>
+            </a:r>
+            <a:endParaRPr lang="da-DK" dirty="0"/>
           </a:p>
         </p:txBody>
       </p:sp>
@@ -7332,7 +8662,7 @@
           <p:cNvPr id="3" name="Pladsholder til indhold 2">
             <a:extLst>
               <a:ext uri="{FF2B5EF4-FFF2-40B4-BE49-F238E27FC236}">
-                <a16:creationId xmlns:a16="http://schemas.microsoft.com/office/drawing/2014/main" id="{EEA2A4C0-BDC2-4035-9BC2-9DA7196FA66D}"/>
+                <a16:creationId xmlns:a16="http://schemas.microsoft.com/office/drawing/2014/main" id="{7FB9FF51-F49E-4A58-9FD3-7E8B92E4D6B6}"/>
               </a:ext>
             </a:extLst>
           </p:cNvPr>
@@ -7348,14 +8678,95 @@
           <a:bodyPr/>
           <a:lstStyle/>
           <a:p>
-            <a:endParaRPr lang="da-DK"/>
+            <a:r>
+              <a:rPr lang="da-DK" dirty="0"/>
+              <a:t>Make interface </a:t>
+            </a:r>
+            <a:r>
+              <a:rPr lang="da-DK" dirty="0" err="1"/>
+              <a:t>consistent</a:t>
+            </a:r>
+            <a:r>
+              <a:rPr lang="da-DK" dirty="0"/>
+              <a:t> – Samme nav bar, farvevalg.</a:t>
+            </a:r>
+          </a:p>
+          <a:p>
+            <a:r>
+              <a:rPr lang="da-DK" dirty="0"/>
+              <a:t>Place user in </a:t>
+            </a:r>
+            <a:r>
+              <a:rPr lang="da-DK" dirty="0" err="1"/>
+              <a:t>control</a:t>
+            </a:r>
+            <a:r>
+              <a:rPr lang="da-DK" dirty="0"/>
+              <a:t> – Altid mulighed for at komme videre eller tilbage</a:t>
+            </a:r>
+          </a:p>
+          <a:p>
+            <a:pPr marL="0" indent="0">
+              <a:buNone/>
+            </a:pPr>
+            <a:endParaRPr lang="da-DK" dirty="0"/>
+          </a:p>
+          <a:p>
+            <a:r>
+              <a:rPr lang="da-DK" dirty="0"/>
+              <a:t>Gestalt: </a:t>
+            </a:r>
+          </a:p>
+          <a:p>
+            <a:r>
+              <a:rPr lang="da-DK" dirty="0"/>
+              <a:t>Law of </a:t>
+            </a:r>
+            <a:r>
+              <a:rPr lang="da-DK" dirty="0" err="1"/>
+              <a:t>proximity</a:t>
+            </a:r>
+            <a:r>
+              <a:rPr lang="da-DK" dirty="0"/>
+              <a:t>: Tags er tæt sammen, så brugeren ved de har noget med hinanden at gøre.</a:t>
+            </a:r>
+          </a:p>
+          <a:p>
+            <a:r>
+              <a:rPr lang="da-DK" dirty="0"/>
+              <a:t>Law of </a:t>
+            </a:r>
+            <a:r>
+              <a:rPr lang="da-DK" dirty="0" err="1"/>
+              <a:t>closure</a:t>
+            </a:r>
+            <a:r>
+              <a:rPr lang="da-DK" dirty="0"/>
+              <a:t>: Søgning, </a:t>
+            </a:r>
+            <a:r>
+              <a:rPr lang="da-DK" dirty="0" err="1"/>
+              <a:t>favorites</a:t>
+            </a:r>
+            <a:r>
+              <a:rPr lang="da-DK" dirty="0"/>
+              <a:t>, top5 er </a:t>
+            </a:r>
+            <a:r>
+              <a:rPr lang="da-DK" dirty="0" err="1"/>
+              <a:t>grouped</a:t>
+            </a:r>
+            <a:r>
+              <a:rPr lang="da-DK" dirty="0"/>
+              <a:t> i aflukkede kasser</a:t>
+            </a:r>
           </a:p>
         </p:txBody>
       </p:sp>
     </p:spTree>
     <p:extLst>
       <p:ext uri="{BB962C8B-B14F-4D97-AF65-F5344CB8AC3E}">
-        <p14:creationId xmlns:p14="http://schemas.microsoft.com/office/powerpoint/2010/main" val="2380534896"/>
+        <p14:creationId xmlns:p14="http://schemas.microsoft.com/office/powerpoint/2010/main" val="2721377203"/>
       </p:ext>
     </p:extLst>
   </p:cSld>
@@ -7382,6 +8793,42 @@
           <a:chExt cx="0" cy="0"/>
         </a:xfrm>
       </p:grpSpPr>
+      <p:pic>
+        <p:nvPicPr>
+          <p:cNvPr id="7" name="Billede 6">
+            <a:extLst>
+              <a:ext uri="{FF2B5EF4-FFF2-40B4-BE49-F238E27FC236}">
+                <a16:creationId xmlns:a16="http://schemas.microsoft.com/office/drawing/2014/main" id="{D0EB26EA-756A-4591-B689-B417ED253C69}"/>
+              </a:ext>
+            </a:extLst>
+          </p:cNvPr>
+          <p:cNvPicPr>
+            <a:picLocks noChangeAspect="1"/>
+          </p:cNvPicPr>
+          <p:nvPr/>
+        </p:nvPicPr>
+        <p:blipFill>
+          <a:blip r:embed="rId2">
+            <a:extLst>
+              <a:ext uri="{28A0092B-C50C-407E-A947-70E740481C1C}">
+                <a14:useLocalDpi xmlns:a14="http://schemas.microsoft.com/office/drawing/2010/main" val="0"/>
+              </a:ext>
+            </a:extLst>
+          </a:blip>
+          <a:stretch>
+            <a:fillRect/>
+          </a:stretch>
+        </p:blipFill>
+        <p:spPr>
+          <a:xfrm>
+            <a:off x="7106566" y="40717"/>
+            <a:ext cx="4525596" cy="6817283"/>
+          </a:xfrm>
+          <a:prstGeom prst="rect">
+            <a:avLst/>
+          </a:prstGeom>
+        </p:spPr>
+      </p:pic>
       <p:sp>
         <p:nvSpPr>
           <p:cNvPr id="2" name="Titel 1">
@@ -7405,36 +8852,53 @@
           <a:p>
             <a:r>
               <a:rPr lang="da-DK" dirty="0"/>
-              <a:t>Klasse diagram og ER diagram</a:t>
-            </a:r>
-          </a:p>
-        </p:txBody>
-      </p:sp>
-      <p:sp>
-        <p:nvSpPr>
-          <p:cNvPr id="3" name="Pladsholder til indhold 2">
+              <a:t>Pakke diagram </a:t>
+            </a:r>
+            <a:br>
+              <a:rPr lang="da-DK" dirty="0"/>
+            </a:br>
+            <a:r>
+              <a:rPr lang="da-DK" dirty="0"/>
+              <a:t>og ER diagram</a:t>
+            </a:r>
+          </a:p>
+        </p:txBody>
+      </p:sp>
+      <p:pic>
+        <p:nvPicPr>
+          <p:cNvPr id="5" name="Pladsholder til indhold 4">
             <a:extLst>
               <a:ext uri="{FF2B5EF4-FFF2-40B4-BE49-F238E27FC236}">
-                <a16:creationId xmlns:a16="http://schemas.microsoft.com/office/drawing/2014/main" id="{562E07D7-B520-4DB1-B94C-9C354E2D805D}"/>
+                <a16:creationId xmlns:a16="http://schemas.microsoft.com/office/drawing/2014/main" id="{0BA11FA4-2892-466D-8F8D-6C02357C8B48}"/>
               </a:ext>
             </a:extLst>
           </p:cNvPr>
-          <p:cNvSpPr>
-            <a:spLocks noGrp="1"/>
-          </p:cNvSpPr>
+          <p:cNvPicPr>
+            <a:picLocks noGrp="1" noChangeAspect="1"/>
+          </p:cNvPicPr>
           <p:nvPr>
             <p:ph idx="1"/>
           </p:nvPr>
-        </p:nvSpPr>
-        <p:spPr/>
-        <p:txBody>
-          <a:bodyPr/>
-          <a:lstStyle/>
-          <a:p>
-            <a:endParaRPr lang="da-DK"/>
-          </a:p>
-        </p:txBody>
-      </p:sp>
+        </p:nvPicPr>
+        <p:blipFill>
+          <a:blip r:embed="rId3">
+            <a:extLst>
+              <a:ext uri="{28A0092B-C50C-407E-A947-70E740481C1C}">
+                <a14:useLocalDpi xmlns:a14="http://schemas.microsoft.com/office/drawing/2010/main" val="0"/>
+              </a:ext>
+            </a:extLst>
+          </a:blip>
+          <a:stretch>
+            <a:fillRect/>
+          </a:stretch>
+        </p:blipFill>
+        <p:spPr>
+          <a:xfrm>
+            <a:off x="335903" y="2087485"/>
+            <a:ext cx="5217140" cy="3697187"/>
+          </a:xfrm>
+        </p:spPr>
+      </p:pic>
     </p:spTree>
     <p:extLst>
       <p:ext uri="{BB962C8B-B14F-4D97-AF65-F5344CB8AC3E}">
@@ -7470,7 +8934,7 @@
           <p:cNvPr id="2" name="Titel 1">
             <a:extLst>
               <a:ext uri="{FF2B5EF4-FFF2-40B4-BE49-F238E27FC236}">
-                <a16:creationId xmlns:a16="http://schemas.microsoft.com/office/drawing/2014/main" id="{5750E6C7-5579-4274-9693-6EDEF0EA95E1}"/>
+                <a16:creationId xmlns:a16="http://schemas.microsoft.com/office/drawing/2014/main" id="{CC441924-03BB-49EE-9B81-3EA6259F9B7A}"/>
               </a:ext>
             </a:extLst>
           </p:cNvPr>
@@ -7487,41 +8951,55 @@
           <a:lstStyle/>
           <a:p>
             <a:r>
+              <a:rPr lang="da-DK" dirty="0" err="1"/>
+              <a:t>Use</a:t>
+            </a:r>
+            <a:r>
               <a:rPr lang="da-DK" dirty="0"/>
-              <a:t>Søge system - Jørgen</a:t>
-            </a:r>
-          </a:p>
-        </p:txBody>
-      </p:sp>
-      <p:sp>
-        <p:nvSpPr>
-          <p:cNvPr id="3" name="Pladsholder til indhold 2">
+              <a:t> case diagram</a:t>
+            </a:r>
+          </a:p>
+        </p:txBody>
+      </p:sp>
+      <p:pic>
+        <p:nvPicPr>
+          <p:cNvPr id="5" name="Pladsholder til indhold 4">
             <a:extLst>
               <a:ext uri="{FF2B5EF4-FFF2-40B4-BE49-F238E27FC236}">
-                <a16:creationId xmlns:a16="http://schemas.microsoft.com/office/drawing/2014/main" id="{B63FF5E0-944C-409C-8FDC-9B24388982CB}"/>
+                <a16:creationId xmlns:a16="http://schemas.microsoft.com/office/drawing/2014/main" id="{DFBE0607-CBE9-49E8-922A-D718992D2713}"/>
               </a:ext>
             </a:extLst>
           </p:cNvPr>
-          <p:cNvSpPr>
-            <a:spLocks noGrp="1"/>
-          </p:cNvSpPr>
+          <p:cNvPicPr>
+            <a:picLocks noGrp="1" noChangeAspect="1"/>
+          </p:cNvPicPr>
           <p:nvPr>
             <p:ph idx="1"/>
           </p:nvPr>
-        </p:nvSpPr>
-        <p:spPr/>
-        <p:txBody>
-          <a:bodyPr/>
-          <a:lstStyle/>
-          <a:p>
-            <a:endParaRPr lang="da-DK"/>
-          </a:p>
-        </p:txBody>
-      </p:sp>
+        </p:nvPicPr>
+        <p:blipFill>
+          <a:blip r:embed="rId2">
+            <a:extLst>
+              <a:ext uri="{28A0092B-C50C-407E-A947-70E740481C1C}">
+                <a14:useLocalDpi xmlns:a14="http://schemas.microsoft.com/office/drawing/2010/main" val="0"/>
+              </a:ext>
+            </a:extLst>
+          </a:blip>
+          <a:stretch>
+            <a:fillRect/>
+          </a:stretch>
+        </p:blipFill>
+        <p:spPr>
+          <a:xfrm>
+            <a:off x="3170912" y="1306913"/>
+            <a:ext cx="4774601" cy="5372423"/>
+          </a:xfrm>
+        </p:spPr>
+      </p:pic>
     </p:spTree>
     <p:extLst>
       <p:ext uri="{BB962C8B-B14F-4D97-AF65-F5344CB8AC3E}">
-        <p14:creationId xmlns:p14="http://schemas.microsoft.com/office/powerpoint/2010/main" val="2831913610"/>
+        <p14:creationId xmlns:p14="http://schemas.microsoft.com/office/powerpoint/2010/main" val="2380534896"/>
       </p:ext>
     </p:extLst>
   </p:cSld>
@@ -7548,47 +9026,12 @@
           <a:chExt cx="0" cy="0"/>
         </a:xfrm>
       </p:grpSpPr>
-      <p:sp>
-        <p:nvSpPr>
-          <p:cNvPr id="2" name="Titel 1">
-            <a:extLst>
-              <a:ext uri="{FF2B5EF4-FFF2-40B4-BE49-F238E27FC236}">
-                <a16:creationId xmlns:a16="http://schemas.microsoft.com/office/drawing/2014/main" id="{6A9CA2F4-7485-416F-B198-962A485611BF}"/>
-              </a:ext>
-            </a:extLst>
-          </p:cNvPr>
-          <p:cNvSpPr>
-            <a:spLocks noGrp="1"/>
-          </p:cNvSpPr>
-          <p:nvPr>
-            <p:ph type="title"/>
-          </p:nvPr>
-        </p:nvSpPr>
-        <p:spPr/>
-        <p:txBody>
-          <a:bodyPr/>
-          <a:lstStyle/>
-          <a:p>
-            <a:r>
-              <a:rPr lang="da-DK" dirty="0"/>
-              <a:t>Tag system – Phillip</a:t>
-            </a:r>
-            <a:br>
-              <a:rPr lang="da-DK" dirty="0"/>
-            </a:br>
-            <a:r>
-              <a:rPr lang="da-DK" dirty="0"/>
-              <a:t>userProfile.html</a:t>
-            </a:r>
-          </a:p>
-        </p:txBody>
-      </p:sp>
       <p:pic>
         <p:nvPicPr>
           <p:cNvPr id="4" name="Billede 3">
             <a:extLst>
               <a:ext uri="{FF2B5EF4-FFF2-40B4-BE49-F238E27FC236}">
-                <a16:creationId xmlns:a16="http://schemas.microsoft.com/office/drawing/2014/main" id="{29399E17-5A65-45E0-83AD-22196DA5F212}"/>
+                <a16:creationId xmlns:a16="http://schemas.microsoft.com/office/drawing/2014/main" id="{78CADDF5-9284-49D5-842A-5D65FEF27F10}"/>
               </a:ext>
             </a:extLst>
           </p:cNvPr>
@@ -7605,8 +9048,228 @@
         </p:blipFill>
         <p:spPr>
           <a:xfrm>
-            <a:off x="292329" y="2452737"/>
-            <a:ext cx="11283754" cy="3427382"/>
+            <a:off x="353148" y="5275821"/>
+            <a:ext cx="4825309" cy="1048431"/>
+          </a:xfrm>
+          <a:prstGeom prst="rect">
+            <a:avLst/>
+          </a:prstGeom>
+        </p:spPr>
+      </p:pic>
+      <p:sp>
+        <p:nvSpPr>
+          <p:cNvPr id="2" name="Titel 1">
+            <a:extLst>
+              <a:ext uri="{FF2B5EF4-FFF2-40B4-BE49-F238E27FC236}">
+                <a16:creationId xmlns:a16="http://schemas.microsoft.com/office/drawing/2014/main" id="{AD22D160-E4F5-49FD-8B12-D53CB7C25925}"/>
+              </a:ext>
+            </a:extLst>
+          </p:cNvPr>
+          <p:cNvSpPr>
+            <a:spLocks noGrp="1"/>
+          </p:cNvSpPr>
+          <p:nvPr>
+            <p:ph type="title"/>
+          </p:nvPr>
+        </p:nvSpPr>
+        <p:spPr/>
+        <p:txBody>
+          <a:bodyPr/>
+          <a:lstStyle/>
+          <a:p>
+            <a:r>
+              <a:rPr lang="da-DK" dirty="0"/>
+              <a:t>Søgesystem - Service, DAO, Mapper</a:t>
+            </a:r>
+          </a:p>
+        </p:txBody>
+      </p:sp>
+      <p:sp>
+        <p:nvSpPr>
+          <p:cNvPr id="3" name="Pladsholder til indhold 2">
+            <a:extLst>
+              <a:ext uri="{FF2B5EF4-FFF2-40B4-BE49-F238E27FC236}">
+                <a16:creationId xmlns:a16="http://schemas.microsoft.com/office/drawing/2014/main" id="{ED9932EA-CD4A-49B0-9B95-B71B4320AFCA}"/>
+              </a:ext>
+            </a:extLst>
+          </p:cNvPr>
+          <p:cNvSpPr>
+            <a:spLocks noGrp="1"/>
+          </p:cNvSpPr>
+          <p:nvPr>
+            <p:ph idx="1"/>
+          </p:nvPr>
+        </p:nvSpPr>
+        <p:spPr/>
+        <p:txBody>
+          <a:bodyPr>
+            <a:normAutofit/>
+          </a:bodyPr>
+          <a:lstStyle/>
+          <a:p>
+            <a:pPr marL="0" indent="0">
+              <a:buNone/>
+            </a:pPr>
+            <a:r>
+              <a:rPr lang="da-DK" dirty="0" err="1"/>
+              <a:t>UserDAO</a:t>
+            </a:r>
+            <a:r>
+              <a:rPr lang="da-DK" dirty="0"/>
+              <a:t> laves en </a:t>
+            </a:r>
+            <a:r>
+              <a:rPr lang="da-DK" dirty="0" err="1"/>
+              <a:t>query</a:t>
+            </a:r>
+            <a:r>
+              <a:rPr lang="da-DK" dirty="0"/>
+              <a:t> gennem</a:t>
+            </a:r>
+            <a:br>
+              <a:rPr lang="da-DK" dirty="0"/>
+            </a:br>
+            <a:r>
+              <a:rPr lang="da-DK" dirty="0"/>
+              <a:t>vores </a:t>
+            </a:r>
+            <a:r>
+              <a:rPr lang="da-DK" dirty="0" err="1"/>
+              <a:t>jdbcTemplate</a:t>
+            </a:r>
+            <a:r>
+              <a:rPr lang="da-DK" dirty="0"/>
+              <a:t>:										En tur gennem 															</a:t>
+            </a:r>
+            <a:r>
+              <a:rPr lang="da-DK" dirty="0" err="1"/>
+              <a:t>userMapper</a:t>
+            </a:r>
+            <a:endParaRPr lang="da-DK" dirty="0"/>
+          </a:p>
+          <a:p>
+            <a:pPr marL="0" indent="0">
+              <a:buNone/>
+            </a:pPr>
+            <a:endParaRPr lang="da-DK" dirty="0"/>
+          </a:p>
+          <a:p>
+            <a:pPr marL="0" indent="0">
+              <a:buNone/>
+            </a:pPr>
+            <a:endParaRPr lang="da-DK" dirty="0"/>
+          </a:p>
+          <a:p>
+            <a:pPr marL="0" indent="0">
+              <a:buNone/>
+            </a:pPr>
+            <a:endParaRPr lang="da-DK" dirty="0"/>
+          </a:p>
+          <a:p>
+            <a:pPr marL="0" indent="0">
+              <a:buNone/>
+            </a:pPr>
+            <a:endParaRPr lang="da-DK" dirty="0"/>
+          </a:p>
+          <a:p>
+            <a:pPr marL="0" indent="0">
+              <a:buNone/>
+            </a:pPr>
+            <a:r>
+              <a:rPr lang="da-DK" dirty="0" err="1"/>
+              <a:t>UserService</a:t>
+            </a:r>
+            <a:r>
+              <a:rPr lang="da-DK" dirty="0"/>
+              <a:t>:											</a:t>
+            </a:r>
+          </a:p>
+        </p:txBody>
+      </p:sp>
+      <p:pic>
+        <p:nvPicPr>
+          <p:cNvPr id="6" name="Billede 5">
+            <a:extLst>
+              <a:ext uri="{FF2B5EF4-FFF2-40B4-BE49-F238E27FC236}">
+                <a16:creationId xmlns:a16="http://schemas.microsoft.com/office/drawing/2014/main" id="{40D8B1D6-7E7C-4B5A-BD6F-A86EB4BC22D2}"/>
+              </a:ext>
+            </a:extLst>
+          </p:cNvPr>
+          <p:cNvPicPr>
+            <a:picLocks noChangeAspect="1"/>
+          </p:cNvPicPr>
+          <p:nvPr/>
+        </p:nvPicPr>
+        <p:blipFill>
+          <a:blip r:embed="rId3"/>
+          <a:stretch>
+            <a:fillRect/>
+          </a:stretch>
+        </p:blipFill>
+        <p:spPr>
+          <a:xfrm>
+            <a:off x="7663910" y="3506784"/>
+            <a:ext cx="4371975" cy="295275"/>
+          </a:xfrm>
+          <a:prstGeom prst="rect">
+            <a:avLst/>
+          </a:prstGeom>
+        </p:spPr>
+      </p:pic>
+      <p:pic>
+        <p:nvPicPr>
+          <p:cNvPr id="7" name="Billede 6">
+            <a:extLst>
+              <a:ext uri="{FF2B5EF4-FFF2-40B4-BE49-F238E27FC236}">
+                <a16:creationId xmlns:a16="http://schemas.microsoft.com/office/drawing/2014/main" id="{6CD5EEF5-EC7F-47BB-A544-C72F1BA0248B}"/>
+              </a:ext>
+            </a:extLst>
+          </p:cNvPr>
+          <p:cNvPicPr>
+            <a:picLocks noChangeAspect="1"/>
+          </p:cNvPicPr>
+          <p:nvPr/>
+        </p:nvPicPr>
+        <p:blipFill>
+          <a:blip r:embed="rId4"/>
+          <a:stretch>
+            <a:fillRect/>
+          </a:stretch>
+        </p:blipFill>
+        <p:spPr>
+          <a:xfrm>
+            <a:off x="7663910" y="3087861"/>
+            <a:ext cx="4371975" cy="466725"/>
+          </a:xfrm>
+          <a:prstGeom prst="rect">
+            <a:avLst/>
+          </a:prstGeom>
+        </p:spPr>
+      </p:pic>
+      <p:pic>
+        <p:nvPicPr>
+          <p:cNvPr id="8" name="Billede 7">
+            <a:extLst>
+              <a:ext uri="{FF2B5EF4-FFF2-40B4-BE49-F238E27FC236}">
+                <a16:creationId xmlns:a16="http://schemas.microsoft.com/office/drawing/2014/main" id="{2A830C63-4B88-4612-B495-DF87C866A991}"/>
+              </a:ext>
+            </a:extLst>
+          </p:cNvPr>
+          <p:cNvPicPr>
+            <a:picLocks noChangeAspect="1"/>
+          </p:cNvPicPr>
+          <p:nvPr/>
+        </p:nvPicPr>
+        <p:blipFill>
+          <a:blip r:embed="rId5"/>
+          <a:stretch>
+            <a:fillRect/>
+          </a:stretch>
+        </p:blipFill>
+        <p:spPr>
+          <a:xfrm>
+            <a:off x="211714" y="3021432"/>
+            <a:ext cx="7421732" cy="1285875"/>
           </a:xfrm>
           <a:prstGeom prst="rect">
             <a:avLst/>
@@ -7616,7 +9279,7 @@
     </p:spTree>
     <p:extLst>
       <p:ext uri="{BB962C8B-B14F-4D97-AF65-F5344CB8AC3E}">
-        <p14:creationId xmlns:p14="http://schemas.microsoft.com/office/powerpoint/2010/main" val="3991629191"/>
+        <p14:creationId xmlns:p14="http://schemas.microsoft.com/office/powerpoint/2010/main" val="3852619993"/>
       </p:ext>
     </p:extLst>
   </p:cSld>

</xml_diff>